<commit_message>
reinforced short time fourier transform
</commit_message>
<xml_diff>
--- a/figures/figure.pptx
+++ b/figures/figure.pptx
@@ -12,6 +12,7 @@
     <p:sldId id="262" r:id="rId6"/>
     <p:sldId id="260" r:id="rId7"/>
     <p:sldId id="263" r:id="rId8"/>
+    <p:sldId id="264" r:id="rId9"/>
   </p:sldIdLst>
   <p:sldSz cx="10799763" cy="10799763"/>
   <p:notesSz cx="6797675" cy="9926638"/>
@@ -260,7 +261,7 @@
           <a:p>
             <a:fld id="{D9812761-E0F9-498D-A86D-14F66CBFAB0E}" type="datetimeFigureOut">
               <a:rPr kumimoji="1" lang="ja-JP" altLang="en-US" smtClean="0"/>
-              <a:t>2021/7/3</a:t>
+              <a:t>2021/7/5</a:t>
             </a:fld>
             <a:endParaRPr kumimoji="1" lang="ja-JP" altLang="en-US"/>
           </a:p>
@@ -462,7 +463,7 @@
           <a:p>
             <a:fld id="{D9812761-E0F9-498D-A86D-14F66CBFAB0E}" type="datetimeFigureOut">
               <a:rPr kumimoji="1" lang="ja-JP" altLang="en-US" smtClean="0"/>
-              <a:t>2021/7/3</a:t>
+              <a:t>2021/7/5</a:t>
             </a:fld>
             <a:endParaRPr kumimoji="1" lang="ja-JP" altLang="en-US"/>
           </a:p>
@@ -674,7 +675,7 @@
           <a:p>
             <a:fld id="{D9812761-E0F9-498D-A86D-14F66CBFAB0E}" type="datetimeFigureOut">
               <a:rPr kumimoji="1" lang="ja-JP" altLang="en-US" smtClean="0"/>
-              <a:t>2021/7/3</a:t>
+              <a:t>2021/7/5</a:t>
             </a:fld>
             <a:endParaRPr kumimoji="1" lang="ja-JP" altLang="en-US"/>
           </a:p>
@@ -876,7 +877,7 @@
           <a:p>
             <a:fld id="{D9812761-E0F9-498D-A86D-14F66CBFAB0E}" type="datetimeFigureOut">
               <a:rPr kumimoji="1" lang="ja-JP" altLang="en-US" smtClean="0"/>
-              <a:t>2021/7/3</a:t>
+              <a:t>2021/7/5</a:t>
             </a:fld>
             <a:endParaRPr kumimoji="1" lang="ja-JP" altLang="en-US"/>
           </a:p>
@@ -1120,7 +1121,7 @@
           <a:p>
             <a:fld id="{D9812761-E0F9-498D-A86D-14F66CBFAB0E}" type="datetimeFigureOut">
               <a:rPr kumimoji="1" lang="ja-JP" altLang="en-US" smtClean="0"/>
-              <a:t>2021/7/3</a:t>
+              <a:t>2021/7/5</a:t>
             </a:fld>
             <a:endParaRPr kumimoji="1" lang="ja-JP" altLang="en-US"/>
           </a:p>
@@ -1416,7 +1417,7 @@
           <a:p>
             <a:fld id="{D9812761-E0F9-498D-A86D-14F66CBFAB0E}" type="datetimeFigureOut">
               <a:rPr kumimoji="1" lang="ja-JP" altLang="en-US" smtClean="0"/>
-              <a:t>2021/7/3</a:t>
+              <a:t>2021/7/5</a:t>
             </a:fld>
             <a:endParaRPr kumimoji="1" lang="ja-JP" altLang="en-US"/>
           </a:p>
@@ -1847,7 +1848,7 @@
           <a:p>
             <a:fld id="{D9812761-E0F9-498D-A86D-14F66CBFAB0E}" type="datetimeFigureOut">
               <a:rPr kumimoji="1" lang="ja-JP" altLang="en-US" smtClean="0"/>
-              <a:t>2021/7/3</a:t>
+              <a:t>2021/7/5</a:t>
             </a:fld>
             <a:endParaRPr kumimoji="1" lang="ja-JP" altLang="en-US"/>
           </a:p>
@@ -1965,7 +1966,7 @@
           <a:p>
             <a:fld id="{D9812761-E0F9-498D-A86D-14F66CBFAB0E}" type="datetimeFigureOut">
               <a:rPr kumimoji="1" lang="ja-JP" altLang="en-US" smtClean="0"/>
-              <a:t>2021/7/3</a:t>
+              <a:t>2021/7/5</a:t>
             </a:fld>
             <a:endParaRPr kumimoji="1" lang="ja-JP" altLang="en-US"/>
           </a:p>
@@ -2060,7 +2061,7 @@
           <a:p>
             <a:fld id="{D9812761-E0F9-498D-A86D-14F66CBFAB0E}" type="datetimeFigureOut">
               <a:rPr kumimoji="1" lang="ja-JP" altLang="en-US" smtClean="0"/>
-              <a:t>2021/7/3</a:t>
+              <a:t>2021/7/5</a:t>
             </a:fld>
             <a:endParaRPr kumimoji="1" lang="ja-JP" altLang="en-US"/>
           </a:p>
@@ -2369,7 +2370,7 @@
           <a:p>
             <a:fld id="{D9812761-E0F9-498D-A86D-14F66CBFAB0E}" type="datetimeFigureOut">
               <a:rPr kumimoji="1" lang="ja-JP" altLang="en-US" smtClean="0"/>
-              <a:t>2021/7/3</a:t>
+              <a:t>2021/7/5</a:t>
             </a:fld>
             <a:endParaRPr kumimoji="1" lang="ja-JP" altLang="en-US"/>
           </a:p>
@@ -2626,7 +2627,7 @@
           <a:p>
             <a:fld id="{D9812761-E0F9-498D-A86D-14F66CBFAB0E}" type="datetimeFigureOut">
               <a:rPr kumimoji="1" lang="ja-JP" altLang="en-US" smtClean="0"/>
-              <a:t>2021/7/3</a:t>
+              <a:t>2021/7/5</a:t>
             </a:fld>
             <a:endParaRPr kumimoji="1" lang="ja-JP" altLang="en-US"/>
           </a:p>
@@ -2871,7 +2872,7 @@
           <a:p>
             <a:fld id="{D9812761-E0F9-498D-A86D-14F66CBFAB0E}" type="datetimeFigureOut">
               <a:rPr kumimoji="1" lang="ja-JP" altLang="en-US" smtClean="0"/>
-              <a:t>2021/7/3</a:t>
+              <a:t>2021/7/5</a:t>
             </a:fld>
             <a:endParaRPr kumimoji="1" lang="ja-JP" altLang="en-US"/>
           </a:p>
@@ -5229,8 +5230,8 @@
           </a:fontRef>
         </p:style>
       </p:cxnSp>
-      <mc:AlternateContent xmlns:mc="http://schemas.openxmlformats.org/markup-compatibility/2006">
-        <mc:Choice xmlns:a14="http://schemas.microsoft.com/office/drawing/2010/main" Requires="a14">
+      <mc:AlternateContent xmlns:mc="http://schemas.openxmlformats.org/markup-compatibility/2006" xmlns:a14="http://schemas.microsoft.com/office/drawing/2010/main">
+        <mc:Choice Requires="a14">
           <p:sp>
             <p:nvSpPr>
               <p:cNvPr id="34" name="テキスト ボックス 33">
@@ -5259,6 +5260,7 @@
               </a:bodyPr>
               <a:lstStyle/>
               <a:p>
+                <a:pPr/>
                 <a14:m>
                   <m:oMathPara xmlns:m="http://schemas.openxmlformats.org/officeDocument/2006/math">
                     <m:oMathParaPr>
@@ -5294,7 +5296,7 @@
             </p:txBody>
           </p:sp>
         </mc:Choice>
-        <mc:Fallback>
+        <mc:Fallback xmlns="">
           <p:sp>
             <p:nvSpPr>
               <p:cNvPr id="34" name="テキスト ボックス 33">
@@ -5339,8 +5341,8 @@
           </p:sp>
         </mc:Fallback>
       </mc:AlternateContent>
-      <mc:AlternateContent xmlns:mc="http://schemas.openxmlformats.org/markup-compatibility/2006">
-        <mc:Choice xmlns:a14="http://schemas.microsoft.com/office/drawing/2010/main" Requires="a14">
+      <mc:AlternateContent xmlns:mc="http://schemas.openxmlformats.org/markup-compatibility/2006" xmlns:a14="http://schemas.microsoft.com/office/drawing/2010/main">
+        <mc:Choice Requires="a14">
           <p:sp>
             <p:nvSpPr>
               <p:cNvPr id="35" name="テキスト ボックス 34">
@@ -5369,6 +5371,7 @@
               </a:bodyPr>
               <a:lstStyle/>
               <a:p>
+                <a:pPr/>
                 <a14:m>
                   <m:oMathPara xmlns:m="http://schemas.openxmlformats.org/officeDocument/2006/math">
                     <m:oMathParaPr>
@@ -5404,7 +5407,7 @@
             </p:txBody>
           </p:sp>
         </mc:Choice>
-        <mc:Fallback>
+        <mc:Fallback xmlns="">
           <p:sp>
             <p:nvSpPr>
               <p:cNvPr id="35" name="テキスト ボックス 34">
@@ -5449,8 +5452,8 @@
           </p:sp>
         </mc:Fallback>
       </mc:AlternateContent>
-      <mc:AlternateContent xmlns:mc="http://schemas.openxmlformats.org/markup-compatibility/2006">
-        <mc:Choice xmlns:a14="http://schemas.microsoft.com/office/drawing/2010/main" Requires="a14">
+      <mc:AlternateContent xmlns:mc="http://schemas.openxmlformats.org/markup-compatibility/2006" xmlns:a14="http://schemas.microsoft.com/office/drawing/2010/main">
+        <mc:Choice Requires="a14">
           <p:sp>
             <p:nvSpPr>
               <p:cNvPr id="36" name="テキスト ボックス 35">
@@ -5479,6 +5482,7 @@
               </a:bodyPr>
               <a:lstStyle/>
               <a:p>
+                <a:pPr/>
                 <a14:m>
                   <m:oMathPara xmlns:m="http://schemas.openxmlformats.org/officeDocument/2006/math">
                     <m:oMathParaPr>
@@ -5562,7 +5566,7 @@
             </p:txBody>
           </p:sp>
         </mc:Choice>
-        <mc:Fallback>
+        <mc:Fallback xmlns="">
           <p:sp>
             <p:nvSpPr>
               <p:cNvPr id="36" name="テキスト ボックス 35">
@@ -5607,8 +5611,8 @@
           </p:sp>
         </mc:Fallback>
       </mc:AlternateContent>
-      <mc:AlternateContent xmlns:mc="http://schemas.openxmlformats.org/markup-compatibility/2006">
-        <mc:Choice xmlns:a14="http://schemas.microsoft.com/office/drawing/2010/main" Requires="a14">
+      <mc:AlternateContent xmlns:mc="http://schemas.openxmlformats.org/markup-compatibility/2006" xmlns:a14="http://schemas.microsoft.com/office/drawing/2010/main">
+        <mc:Choice Requires="a14">
           <p:sp>
             <p:nvSpPr>
               <p:cNvPr id="37" name="テキスト ボックス 36">
@@ -5637,6 +5641,7 @@
               </a:bodyPr>
               <a:lstStyle/>
               <a:p>
+                <a:pPr/>
                 <a14:m>
                   <m:oMathPara xmlns:m="http://schemas.openxmlformats.org/officeDocument/2006/math">
                     <m:oMathParaPr>
@@ -5738,7 +5743,7 @@
             </p:txBody>
           </p:sp>
         </mc:Choice>
-        <mc:Fallback>
+        <mc:Fallback xmlns="">
           <p:sp>
             <p:nvSpPr>
               <p:cNvPr id="37" name="テキスト ボックス 36">
@@ -5783,8 +5788,8 @@
           </p:sp>
         </mc:Fallback>
       </mc:AlternateContent>
-      <mc:AlternateContent xmlns:mc="http://schemas.openxmlformats.org/markup-compatibility/2006">
-        <mc:Choice xmlns:a14="http://schemas.microsoft.com/office/drawing/2010/main" Requires="a14">
+      <mc:AlternateContent xmlns:mc="http://schemas.openxmlformats.org/markup-compatibility/2006" xmlns:a14="http://schemas.microsoft.com/office/drawing/2010/main">
+        <mc:Choice Requires="a14">
           <p:sp>
             <p:nvSpPr>
               <p:cNvPr id="38" name="テキスト ボックス 37">
@@ -5813,6 +5818,7 @@
               </a:bodyPr>
               <a:lstStyle/>
               <a:p>
+                <a:pPr/>
                 <a14:m>
                   <m:oMathPara xmlns:m="http://schemas.openxmlformats.org/officeDocument/2006/math">
                     <m:oMathParaPr>
@@ -5860,7 +5866,7 @@
             </p:txBody>
           </p:sp>
         </mc:Choice>
-        <mc:Fallback>
+        <mc:Fallback xmlns="">
           <p:sp>
             <p:nvSpPr>
               <p:cNvPr id="38" name="テキスト ボックス 37">
@@ -6299,8 +6305,8 @@
           </a:p>
         </p:txBody>
       </p:sp>
-      <mc:AlternateContent xmlns:mc="http://schemas.openxmlformats.org/markup-compatibility/2006">
-        <mc:Choice xmlns:a14="http://schemas.microsoft.com/office/drawing/2010/main" Requires="a14">
+      <mc:AlternateContent xmlns:mc="http://schemas.openxmlformats.org/markup-compatibility/2006" xmlns:a14="http://schemas.microsoft.com/office/drawing/2010/main">
+        <mc:Choice Requires="a14">
           <p:sp>
             <p:nvSpPr>
               <p:cNvPr id="34" name="テキスト ボックス 33">
@@ -6329,6 +6335,7 @@
               </a:bodyPr>
               <a:lstStyle/>
               <a:p>
+                <a:pPr/>
                 <a14:m>
                   <m:oMathPara xmlns:m="http://schemas.openxmlformats.org/officeDocument/2006/math">
                     <m:oMathParaPr>
@@ -6364,7 +6371,7 @@
             </p:txBody>
           </p:sp>
         </mc:Choice>
-        <mc:Fallback>
+        <mc:Fallback xmlns="">
           <p:sp>
             <p:nvSpPr>
               <p:cNvPr id="34" name="テキスト ボックス 33">
@@ -6409,8 +6416,8 @@
           </p:sp>
         </mc:Fallback>
       </mc:AlternateContent>
-      <mc:AlternateContent xmlns:mc="http://schemas.openxmlformats.org/markup-compatibility/2006">
-        <mc:Choice xmlns:a14="http://schemas.microsoft.com/office/drawing/2010/main" Requires="a14">
+      <mc:AlternateContent xmlns:mc="http://schemas.openxmlformats.org/markup-compatibility/2006" xmlns:a14="http://schemas.microsoft.com/office/drawing/2010/main">
+        <mc:Choice Requires="a14">
           <p:sp>
             <p:nvSpPr>
               <p:cNvPr id="35" name="テキスト ボックス 34">
@@ -6439,6 +6446,7 @@
               </a:bodyPr>
               <a:lstStyle/>
               <a:p>
+                <a:pPr/>
                 <a14:m>
                   <m:oMathPara xmlns:m="http://schemas.openxmlformats.org/officeDocument/2006/math">
                     <m:oMathParaPr>
@@ -6474,7 +6482,7 @@
             </p:txBody>
           </p:sp>
         </mc:Choice>
-        <mc:Fallback>
+        <mc:Fallback xmlns="">
           <p:sp>
             <p:nvSpPr>
               <p:cNvPr id="35" name="テキスト ボックス 34">
@@ -6519,8 +6527,8 @@
           </p:sp>
         </mc:Fallback>
       </mc:AlternateContent>
-      <mc:AlternateContent xmlns:mc="http://schemas.openxmlformats.org/markup-compatibility/2006">
-        <mc:Choice xmlns:a14="http://schemas.microsoft.com/office/drawing/2010/main" Requires="a14">
+      <mc:AlternateContent xmlns:mc="http://schemas.openxmlformats.org/markup-compatibility/2006" xmlns:a14="http://schemas.microsoft.com/office/drawing/2010/main">
+        <mc:Choice Requires="a14">
           <p:sp>
             <p:nvSpPr>
               <p:cNvPr id="36" name="テキスト ボックス 35">
@@ -6655,7 +6663,7 @@
             </p:txBody>
           </p:sp>
         </mc:Choice>
-        <mc:Fallback>
+        <mc:Fallback xmlns="">
           <p:sp>
             <p:nvSpPr>
               <p:cNvPr id="36" name="テキスト ボックス 35">
@@ -6910,8 +6918,8 @@
           </a:p>
         </p:txBody>
       </p:sp>
-      <mc:AlternateContent xmlns:mc="http://schemas.openxmlformats.org/markup-compatibility/2006">
-        <mc:Choice xmlns:a14="http://schemas.microsoft.com/office/drawing/2010/main" Requires="a14">
+      <mc:AlternateContent xmlns:mc="http://schemas.openxmlformats.org/markup-compatibility/2006" xmlns:a14="http://schemas.microsoft.com/office/drawing/2010/main">
+        <mc:Choice Requires="a14">
           <p:sp>
             <p:nvSpPr>
               <p:cNvPr id="10" name="テキスト ボックス 9">
@@ -6940,6 +6948,7 @@
               </a:bodyPr>
               <a:lstStyle/>
               <a:p>
+                <a:pPr/>
                 <a14:m>
                   <m:oMathPara xmlns:m="http://schemas.openxmlformats.org/officeDocument/2006/math">
                     <m:oMathParaPr>
@@ -6976,7 +6985,7 @@
             </p:txBody>
           </p:sp>
         </mc:Choice>
-        <mc:Fallback>
+        <mc:Fallback xmlns="">
           <p:sp>
             <p:nvSpPr>
               <p:cNvPr id="10" name="テキスト ボックス 9">
@@ -7021,8 +7030,8 @@
           </p:sp>
         </mc:Fallback>
       </mc:AlternateContent>
-      <mc:AlternateContent xmlns:mc="http://schemas.openxmlformats.org/markup-compatibility/2006">
-        <mc:Choice xmlns:a14="http://schemas.microsoft.com/office/drawing/2010/main" Requires="a14">
+      <mc:AlternateContent xmlns:mc="http://schemas.openxmlformats.org/markup-compatibility/2006" xmlns:a14="http://schemas.microsoft.com/office/drawing/2010/main">
+        <mc:Choice Requires="a14">
           <p:sp>
             <p:nvSpPr>
               <p:cNvPr id="11" name="テキスト ボックス 10">
@@ -7051,6 +7060,7 @@
               </a:bodyPr>
               <a:lstStyle/>
               <a:p>
+                <a:pPr/>
                 <a14:m>
                   <m:oMathPara xmlns:m="http://schemas.openxmlformats.org/officeDocument/2006/math">
                     <m:oMathParaPr>
@@ -7087,7 +7097,7 @@
             </p:txBody>
           </p:sp>
         </mc:Choice>
-        <mc:Fallback>
+        <mc:Fallback xmlns="">
           <p:sp>
             <p:nvSpPr>
               <p:cNvPr id="11" name="テキスト ボックス 10">
@@ -7270,8 +7280,8 @@
           </a:fontRef>
         </p:style>
       </p:cxnSp>
-      <mc:AlternateContent xmlns:mc="http://schemas.openxmlformats.org/markup-compatibility/2006">
-        <mc:Choice xmlns:a14="http://schemas.microsoft.com/office/drawing/2010/main" Requires="a14">
+      <mc:AlternateContent xmlns:mc="http://schemas.openxmlformats.org/markup-compatibility/2006" xmlns:a14="http://schemas.microsoft.com/office/drawing/2010/main">
+        <mc:Choice Requires="a14">
           <p:sp>
             <p:nvSpPr>
               <p:cNvPr id="15" name="テキスト ボックス 14">
@@ -7300,6 +7310,7 @@
               </a:bodyPr>
               <a:lstStyle/>
               <a:p>
+                <a:pPr/>
                 <a14:m>
                   <m:oMathPara xmlns:m="http://schemas.openxmlformats.org/officeDocument/2006/math">
                     <m:oMathParaPr>
@@ -7401,7 +7412,7 @@
             </p:txBody>
           </p:sp>
         </mc:Choice>
-        <mc:Fallback>
+        <mc:Fallback xmlns="">
           <p:sp>
             <p:nvSpPr>
               <p:cNvPr id="15" name="テキスト ボックス 14">
@@ -7446,8 +7457,8 @@
           </p:sp>
         </mc:Fallback>
       </mc:AlternateContent>
-      <mc:AlternateContent xmlns:mc="http://schemas.openxmlformats.org/markup-compatibility/2006">
-        <mc:Choice xmlns:a14="http://schemas.microsoft.com/office/drawing/2010/main" Requires="a14">
+      <mc:AlternateContent xmlns:mc="http://schemas.openxmlformats.org/markup-compatibility/2006" xmlns:a14="http://schemas.microsoft.com/office/drawing/2010/main">
+        <mc:Choice Requires="a14">
           <p:sp>
             <p:nvSpPr>
               <p:cNvPr id="16" name="テキスト ボックス 15">
@@ -7476,6 +7487,7 @@
               </a:bodyPr>
               <a:lstStyle/>
               <a:p>
+                <a:pPr/>
                 <a14:m>
                   <m:oMathPara xmlns:m="http://schemas.openxmlformats.org/officeDocument/2006/math">
                     <m:oMathParaPr>
@@ -7655,7 +7667,7 @@
             </p:txBody>
           </p:sp>
         </mc:Choice>
-        <mc:Fallback>
+        <mc:Fallback xmlns="">
           <p:sp>
             <p:nvSpPr>
               <p:cNvPr id="16" name="テキスト ボックス 15">
@@ -7758,8 +7770,8 @@
           </a:p>
         </p:txBody>
       </p:sp>
-      <mc:AlternateContent xmlns:mc="http://schemas.openxmlformats.org/markup-compatibility/2006">
-        <mc:Choice xmlns:a14="http://schemas.microsoft.com/office/drawing/2010/main" Requires="a14">
+      <mc:AlternateContent xmlns:mc="http://schemas.openxmlformats.org/markup-compatibility/2006" xmlns:a14="http://schemas.microsoft.com/office/drawing/2010/main">
+        <mc:Choice Requires="a14">
           <p:sp>
             <p:nvSpPr>
               <p:cNvPr id="18" name="テキスト ボックス 17">
@@ -7788,6 +7800,7 @@
               </a:bodyPr>
               <a:lstStyle/>
               <a:p>
+                <a:pPr/>
                 <a14:m>
                   <m:oMathPara xmlns:m="http://schemas.openxmlformats.org/officeDocument/2006/math">
                     <m:oMathParaPr>
@@ -7824,7 +7837,7 @@
             </p:txBody>
           </p:sp>
         </mc:Choice>
-        <mc:Fallback>
+        <mc:Fallback xmlns="">
           <p:sp>
             <p:nvSpPr>
               <p:cNvPr id="18" name="テキスト ボックス 17">
@@ -7869,8 +7882,8 @@
           </p:sp>
         </mc:Fallback>
       </mc:AlternateContent>
-      <mc:AlternateContent xmlns:mc="http://schemas.openxmlformats.org/markup-compatibility/2006">
-        <mc:Choice xmlns:a14="http://schemas.microsoft.com/office/drawing/2010/main" Requires="a14">
+      <mc:AlternateContent xmlns:mc="http://schemas.openxmlformats.org/markup-compatibility/2006" xmlns:a14="http://schemas.microsoft.com/office/drawing/2010/main">
+        <mc:Choice Requires="a14">
           <p:sp>
             <p:nvSpPr>
               <p:cNvPr id="19" name="テキスト ボックス 18">
@@ -7899,6 +7912,7 @@
               </a:bodyPr>
               <a:lstStyle/>
               <a:p>
+                <a:pPr/>
                 <a14:m>
                   <m:oMathPara xmlns:m="http://schemas.openxmlformats.org/officeDocument/2006/math">
                     <m:oMathParaPr>
@@ -7935,7 +7949,7 @@
             </p:txBody>
           </p:sp>
         </mc:Choice>
-        <mc:Fallback>
+        <mc:Fallback xmlns="">
           <p:sp>
             <p:nvSpPr>
               <p:cNvPr id="19" name="テキスト ボックス 18">
@@ -8010,8 +8024,8 @@
           <a:chExt cx="0" cy="0"/>
         </a:xfrm>
       </p:grpSpPr>
-      <mc:AlternateContent xmlns:mc="http://schemas.openxmlformats.org/markup-compatibility/2006">
-        <mc:Choice xmlns:a14="http://schemas.microsoft.com/office/drawing/2010/main" Requires="a14">
+      <mc:AlternateContent xmlns:mc="http://schemas.openxmlformats.org/markup-compatibility/2006" xmlns:a14="http://schemas.microsoft.com/office/drawing/2010/main">
+        <mc:Choice Requires="a14">
           <p:sp>
             <p:nvSpPr>
               <p:cNvPr id="8" name="テキスト ボックス 7">
@@ -8040,6 +8054,7 @@
               </a:bodyPr>
               <a:lstStyle/>
               <a:p>
+                <a:pPr/>
                 <a14:m>
                   <m:oMathPara xmlns:m="http://schemas.openxmlformats.org/officeDocument/2006/math">
                     <m:oMathParaPr>
@@ -8076,7 +8091,7 @@
             </p:txBody>
           </p:sp>
         </mc:Choice>
-        <mc:Fallback>
+        <mc:Fallback xmlns="">
           <p:sp>
             <p:nvSpPr>
               <p:cNvPr id="8" name="テキスト ボックス 7">
@@ -8121,8 +8136,8 @@
           </p:sp>
         </mc:Fallback>
       </mc:AlternateContent>
-      <mc:AlternateContent xmlns:mc="http://schemas.openxmlformats.org/markup-compatibility/2006">
-        <mc:Choice xmlns:a14="http://schemas.microsoft.com/office/drawing/2010/main" Requires="a14">
+      <mc:AlternateContent xmlns:mc="http://schemas.openxmlformats.org/markup-compatibility/2006" xmlns:a14="http://schemas.microsoft.com/office/drawing/2010/main">
+        <mc:Choice Requires="a14">
           <p:sp>
             <p:nvSpPr>
               <p:cNvPr id="13" name="テキスト ボックス 12">
@@ -8151,6 +8166,7 @@
               </a:bodyPr>
               <a:lstStyle/>
               <a:p>
+                <a:pPr/>
                 <a14:m>
                   <m:oMathPara xmlns:m="http://schemas.openxmlformats.org/officeDocument/2006/math">
                     <m:oMathParaPr>
@@ -8187,7 +8203,7 @@
             </p:txBody>
           </p:sp>
         </mc:Choice>
-        <mc:Fallback>
+        <mc:Fallback xmlns="">
           <p:sp>
             <p:nvSpPr>
               <p:cNvPr id="13" name="テキスト ボックス 12">
@@ -8232,8 +8248,8 @@
           </p:sp>
         </mc:Fallback>
       </mc:AlternateContent>
-      <mc:AlternateContent xmlns:mc="http://schemas.openxmlformats.org/markup-compatibility/2006">
-        <mc:Choice xmlns:a14="http://schemas.microsoft.com/office/drawing/2010/main" Requires="a14">
+      <mc:AlternateContent xmlns:mc="http://schemas.openxmlformats.org/markup-compatibility/2006" xmlns:a14="http://schemas.microsoft.com/office/drawing/2010/main">
+        <mc:Choice Requires="a14">
           <p:sp>
             <p:nvSpPr>
               <p:cNvPr id="14" name="テキスト ボックス 13">
@@ -8262,6 +8278,7 @@
               </a:bodyPr>
               <a:lstStyle/>
               <a:p>
+                <a:pPr/>
                 <a14:m>
                   <m:oMathPara xmlns:m="http://schemas.openxmlformats.org/officeDocument/2006/math">
                     <m:oMathParaPr>
@@ -8363,7 +8380,7 @@
             </p:txBody>
           </p:sp>
         </mc:Choice>
-        <mc:Fallback>
+        <mc:Fallback xmlns="">
           <p:sp>
             <p:nvSpPr>
               <p:cNvPr id="14" name="テキスト ボックス 13">
@@ -8713,8 +8730,8 @@
           </a:fontRef>
         </p:style>
       </p:cxnSp>
-      <mc:AlternateContent xmlns:mc="http://schemas.openxmlformats.org/markup-compatibility/2006">
-        <mc:Choice xmlns:a14="http://schemas.microsoft.com/office/drawing/2010/main" Requires="a14">
+      <mc:AlternateContent xmlns:mc="http://schemas.openxmlformats.org/markup-compatibility/2006" xmlns:a14="http://schemas.microsoft.com/office/drawing/2010/main">
+        <mc:Choice Requires="a14">
           <p:sp>
             <p:nvSpPr>
               <p:cNvPr id="12" name="テキスト ボックス 11">
@@ -8743,6 +8760,7 @@
               </a:bodyPr>
               <a:lstStyle/>
               <a:p>
+                <a:pPr/>
                 <a14:m>
                   <m:oMathPara xmlns:m="http://schemas.openxmlformats.org/officeDocument/2006/math">
                     <m:oMathParaPr>
@@ -8779,7 +8797,7 @@
             </p:txBody>
           </p:sp>
         </mc:Choice>
-        <mc:Fallback>
+        <mc:Fallback xmlns="">
           <p:sp>
             <p:nvSpPr>
               <p:cNvPr id="12" name="テキスト ボックス 11">
@@ -8924,8 +8942,8 @@
           </a:p>
         </p:txBody>
       </p:sp>
-      <mc:AlternateContent xmlns:mc="http://schemas.openxmlformats.org/markup-compatibility/2006">
-        <mc:Choice xmlns:a14="http://schemas.microsoft.com/office/drawing/2010/main" Requires="a14">
+      <mc:AlternateContent xmlns:mc="http://schemas.openxmlformats.org/markup-compatibility/2006" xmlns:a14="http://schemas.microsoft.com/office/drawing/2010/main">
+        <mc:Choice Requires="a14">
           <p:sp>
             <p:nvSpPr>
               <p:cNvPr id="23" name="テキスト ボックス 22">
@@ -8954,6 +8972,7 @@
               </a:bodyPr>
               <a:lstStyle/>
               <a:p>
+                <a:pPr/>
                 <a14:m>
                   <m:oMathPara xmlns:m="http://schemas.openxmlformats.org/officeDocument/2006/math">
                     <m:oMathParaPr>
@@ -9106,7 +9125,7 @@
             </p:txBody>
           </p:sp>
         </mc:Choice>
-        <mc:Fallback>
+        <mc:Fallback xmlns="">
           <p:sp>
             <p:nvSpPr>
               <p:cNvPr id="23" name="テキスト ボックス 22">
@@ -9155,6 +9174,1358 @@
     <p:extLst>
       <p:ext uri="{BB962C8B-B14F-4D97-AF65-F5344CB8AC3E}">
         <p14:creationId xmlns:p14="http://schemas.microsoft.com/office/powerpoint/2010/main" val="3529317967"/>
+      </p:ext>
+    </p:extLst>
+  </p:cSld>
+  <p:clrMapOvr>
+    <a:masterClrMapping/>
+  </p:clrMapOvr>
+</p:sld>
+</file>
+
+<file path=ppt/slides/slide8.xml><?xml version="1.0" encoding="utf-8"?>
+<p:sld xmlns:a="http://schemas.openxmlformats.org/drawingml/2006/main" xmlns:r="http://schemas.openxmlformats.org/officeDocument/2006/relationships" xmlns:p="http://schemas.openxmlformats.org/presentationml/2006/main">
+  <p:cSld>
+    <p:spTree>
+      <p:nvGrpSpPr>
+        <p:cNvPr id="1" name=""/>
+        <p:cNvGrpSpPr/>
+        <p:nvPr/>
+      </p:nvGrpSpPr>
+      <p:grpSpPr>
+        <a:xfrm>
+          <a:off x="0" y="0"/>
+          <a:ext cx="0" cy="0"/>
+          <a:chOff x="0" y="0"/>
+          <a:chExt cx="0" cy="0"/>
+        </a:xfrm>
+      </p:grpSpPr>
+      <p:cxnSp>
+        <p:nvCxnSpPr>
+          <p:cNvPr id="6" name="直線コネクタ 5">
+            <a:extLst>
+              <a:ext uri="{FF2B5EF4-FFF2-40B4-BE49-F238E27FC236}">
+                <a16:creationId xmlns:a16="http://schemas.microsoft.com/office/drawing/2014/main" id="{4F182334-7B06-4EC2-9092-C8AAE9BDE9A5}"/>
+              </a:ext>
+            </a:extLst>
+          </p:cNvPr>
+          <p:cNvCxnSpPr>
+            <a:cxnSpLocks/>
+          </p:cNvCxnSpPr>
+          <p:nvPr/>
+        </p:nvCxnSpPr>
+        <p:spPr>
+          <a:xfrm>
+            <a:off x="1056640" y="3941154"/>
+            <a:ext cx="4313555" cy="0"/>
+          </a:xfrm>
+          <a:prstGeom prst="line">
+            <a:avLst/>
+          </a:prstGeom>
+          <a:ln w="57150">
+            <a:solidFill>
+              <a:schemeClr val="tx1">
+                <a:lumMod val="50000"/>
+                <a:lumOff val="50000"/>
+              </a:schemeClr>
+            </a:solidFill>
+          </a:ln>
+        </p:spPr>
+        <p:style>
+          <a:lnRef idx="1">
+            <a:schemeClr val="dk1"/>
+          </a:lnRef>
+          <a:fillRef idx="0">
+            <a:schemeClr val="dk1"/>
+          </a:fillRef>
+          <a:effectRef idx="0">
+            <a:schemeClr val="dk1"/>
+          </a:effectRef>
+          <a:fontRef idx="minor">
+            <a:schemeClr val="tx1"/>
+          </a:fontRef>
+        </p:style>
+      </p:cxnSp>
+      <p:cxnSp>
+        <p:nvCxnSpPr>
+          <p:cNvPr id="7" name="直線コネクタ 6">
+            <a:extLst>
+              <a:ext uri="{FF2B5EF4-FFF2-40B4-BE49-F238E27FC236}">
+                <a16:creationId xmlns:a16="http://schemas.microsoft.com/office/drawing/2014/main" id="{36C8AE4B-C5C9-4E7F-A3E5-86D27DE4A5FA}"/>
+              </a:ext>
+            </a:extLst>
+          </p:cNvPr>
+          <p:cNvCxnSpPr>
+            <a:cxnSpLocks/>
+          </p:cNvCxnSpPr>
+          <p:nvPr/>
+        </p:nvCxnSpPr>
+        <p:spPr>
+          <a:xfrm>
+            <a:off x="1087120" y="828759"/>
+            <a:ext cx="0" cy="3112395"/>
+          </a:xfrm>
+          <a:prstGeom prst="line">
+            <a:avLst/>
+          </a:prstGeom>
+          <a:ln w="57150">
+            <a:solidFill>
+              <a:schemeClr val="tx1">
+                <a:lumMod val="50000"/>
+                <a:lumOff val="50000"/>
+              </a:schemeClr>
+            </a:solidFill>
+          </a:ln>
+        </p:spPr>
+        <p:style>
+          <a:lnRef idx="1">
+            <a:schemeClr val="dk1"/>
+          </a:lnRef>
+          <a:fillRef idx="0">
+            <a:schemeClr val="dk1"/>
+          </a:fillRef>
+          <a:effectRef idx="0">
+            <a:schemeClr val="dk1"/>
+          </a:effectRef>
+          <a:fontRef idx="minor">
+            <a:schemeClr val="tx1"/>
+          </a:fontRef>
+        </p:style>
+      </p:cxnSp>
+      <mc:AlternateContent xmlns:mc="http://schemas.openxmlformats.org/markup-compatibility/2006">
+        <mc:Choice xmlns:a14="http://schemas.microsoft.com/office/drawing/2010/main" Requires="a14">
+          <p:sp>
+            <p:nvSpPr>
+              <p:cNvPr id="8" name="テキスト ボックス 7">
+                <a:extLst>
+                  <a:ext uri="{FF2B5EF4-FFF2-40B4-BE49-F238E27FC236}">
+                    <a16:creationId xmlns:a16="http://schemas.microsoft.com/office/drawing/2014/main" id="{B9E4A19B-125F-44F1-A57B-595A8F5F557D}"/>
+                  </a:ext>
+                </a:extLst>
+              </p:cNvPr>
+              <p:cNvSpPr txBox="1"/>
+              <p:nvPr/>
+            </p:nvSpPr>
+            <p:spPr>
+              <a:xfrm>
+                <a:off x="-788162" y="312297"/>
+                <a:ext cx="3004131" cy="523220"/>
+              </a:xfrm>
+              <a:prstGeom prst="rect">
+                <a:avLst/>
+              </a:prstGeom>
+              <a:noFill/>
+            </p:spPr>
+            <p:txBody>
+              <a:bodyPr wrap="square" rtlCol="0">
+                <a:spAutoFit/>
+              </a:bodyPr>
+              <a:lstStyle/>
+              <a:p>
+                <a:pPr/>
+                <a14:m>
+                  <m:oMathPara xmlns:m="http://schemas.openxmlformats.org/officeDocument/2006/math">
+                    <m:oMathParaPr>
+                      <m:jc m:val="centerGroup"/>
+                    </m:oMathParaPr>
+                    <m:oMath xmlns:m="http://schemas.openxmlformats.org/officeDocument/2006/math">
+                      <m:r>
+                        <a:rPr lang="en-US" altLang="ja-JP" sz="2800" b="1" i="1" smtClean="0">
+                          <a:solidFill>
+                            <a:schemeClr val="tx1">
+                              <a:lumMod val="65000"/>
+                              <a:lumOff val="35000"/>
+                            </a:schemeClr>
+                          </a:solidFill>
+                          <a:latin typeface="Cambria Math" panose="02040503050406030204" pitchFamily="18" charset="0"/>
+                          <a:ea typeface="Meiryo UI" panose="020B0604030504040204" pitchFamily="50" charset="-128"/>
+                        </a:rPr>
+                        <m:t>𝒇𝒓𝒆𝒒</m:t>
+                      </m:r>
+                    </m:oMath>
+                  </m:oMathPara>
+                </a14:m>
+                <a:endParaRPr lang="ja-JP" altLang="en-US" sz="2800" b="1" dirty="0">
+                  <a:solidFill>
+                    <a:schemeClr val="tx1">
+                      <a:lumMod val="65000"/>
+                      <a:lumOff val="35000"/>
+                    </a:schemeClr>
+                  </a:solidFill>
+                  <a:latin typeface="Meiryo UI" panose="020B0604030504040204" pitchFamily="50" charset="-128"/>
+                  <a:ea typeface="Meiryo UI" panose="020B0604030504040204" pitchFamily="50" charset="-128"/>
+                </a:endParaRPr>
+              </a:p>
+            </p:txBody>
+          </p:sp>
+        </mc:Choice>
+        <mc:Fallback>
+          <p:sp>
+            <p:nvSpPr>
+              <p:cNvPr id="8" name="テキスト ボックス 7">
+                <a:extLst>
+                  <a:ext uri="{FF2B5EF4-FFF2-40B4-BE49-F238E27FC236}">
+                    <a16:creationId xmlns:a16="http://schemas.microsoft.com/office/drawing/2014/main" id="{B9E4A19B-125F-44F1-A57B-595A8F5F557D}"/>
+                  </a:ext>
+                </a:extLst>
+              </p:cNvPr>
+              <p:cNvSpPr txBox="1">
+                <a:spLocks noRot="1" noChangeAspect="1" noMove="1" noResize="1" noEditPoints="1" noAdjustHandles="1" noChangeArrowheads="1" noChangeShapeType="1" noTextEdit="1"/>
+              </p:cNvSpPr>
+              <p:nvPr/>
+            </p:nvSpPr>
+            <p:spPr>
+              <a:xfrm>
+                <a:off x="-788162" y="312297"/>
+                <a:ext cx="3004131" cy="523220"/>
+              </a:xfrm>
+              <a:prstGeom prst="rect">
+                <a:avLst/>
+              </a:prstGeom>
+              <a:blipFill>
+                <a:blip r:embed="rId2"/>
+                <a:stretch>
+                  <a:fillRect/>
+                </a:stretch>
+              </a:blipFill>
+            </p:spPr>
+            <p:txBody>
+              <a:bodyPr/>
+              <a:lstStyle/>
+              <a:p>
+                <a:r>
+                  <a:rPr lang="ja-JP" altLang="en-US">
+                    <a:noFill/>
+                  </a:rPr>
+                  <a:t> </a:t>
+                </a:r>
+              </a:p>
+            </p:txBody>
+          </p:sp>
+        </mc:Fallback>
+      </mc:AlternateContent>
+      <p:cxnSp>
+        <p:nvCxnSpPr>
+          <p:cNvPr id="14" name="直線コネクタ 13">
+            <a:extLst>
+              <a:ext uri="{FF2B5EF4-FFF2-40B4-BE49-F238E27FC236}">
+                <a16:creationId xmlns:a16="http://schemas.microsoft.com/office/drawing/2014/main" id="{9F84CBCD-5B0E-4401-A316-9D7B76E0B1FB}"/>
+              </a:ext>
+            </a:extLst>
+          </p:cNvPr>
+          <p:cNvCxnSpPr>
+            <a:cxnSpLocks/>
+          </p:cNvCxnSpPr>
+          <p:nvPr/>
+        </p:nvCxnSpPr>
+        <p:spPr>
+          <a:xfrm>
+            <a:off x="6088453" y="3941154"/>
+            <a:ext cx="4366677" cy="0"/>
+          </a:xfrm>
+          <a:prstGeom prst="line">
+            <a:avLst/>
+          </a:prstGeom>
+          <a:ln w="57150">
+            <a:solidFill>
+              <a:schemeClr val="tx1">
+                <a:lumMod val="50000"/>
+                <a:lumOff val="50000"/>
+              </a:schemeClr>
+            </a:solidFill>
+          </a:ln>
+        </p:spPr>
+        <p:style>
+          <a:lnRef idx="1">
+            <a:schemeClr val="dk1"/>
+          </a:lnRef>
+          <a:fillRef idx="0">
+            <a:schemeClr val="dk1"/>
+          </a:fillRef>
+          <a:effectRef idx="0">
+            <a:schemeClr val="dk1"/>
+          </a:effectRef>
+          <a:fontRef idx="minor">
+            <a:schemeClr val="tx1"/>
+          </a:fontRef>
+        </p:style>
+      </p:cxnSp>
+      <p:cxnSp>
+        <p:nvCxnSpPr>
+          <p:cNvPr id="15" name="直線コネクタ 14">
+            <a:extLst>
+              <a:ext uri="{FF2B5EF4-FFF2-40B4-BE49-F238E27FC236}">
+                <a16:creationId xmlns:a16="http://schemas.microsoft.com/office/drawing/2014/main" id="{C582AEEE-9C10-4616-A8E0-068FD736C7E5}"/>
+              </a:ext>
+            </a:extLst>
+          </p:cNvPr>
+          <p:cNvCxnSpPr>
+            <a:cxnSpLocks/>
+          </p:cNvCxnSpPr>
+          <p:nvPr/>
+        </p:nvCxnSpPr>
+        <p:spPr>
+          <a:xfrm>
+            <a:off x="6118933" y="828759"/>
+            <a:ext cx="0" cy="3112395"/>
+          </a:xfrm>
+          <a:prstGeom prst="line">
+            <a:avLst/>
+          </a:prstGeom>
+          <a:ln w="57150">
+            <a:solidFill>
+              <a:schemeClr val="tx1">
+                <a:lumMod val="50000"/>
+                <a:lumOff val="50000"/>
+              </a:schemeClr>
+            </a:solidFill>
+          </a:ln>
+        </p:spPr>
+        <p:style>
+          <a:lnRef idx="1">
+            <a:schemeClr val="dk1"/>
+          </a:lnRef>
+          <a:fillRef idx="0">
+            <a:schemeClr val="dk1"/>
+          </a:fillRef>
+          <a:effectRef idx="0">
+            <a:schemeClr val="dk1"/>
+          </a:effectRef>
+          <a:fontRef idx="minor">
+            <a:schemeClr val="tx1"/>
+          </a:fontRef>
+        </p:style>
+      </p:cxnSp>
+      <mc:AlternateContent xmlns:mc="http://schemas.openxmlformats.org/markup-compatibility/2006">
+        <mc:Choice xmlns:a14="http://schemas.microsoft.com/office/drawing/2010/main" Requires="a14">
+          <p:sp>
+            <p:nvSpPr>
+              <p:cNvPr id="16" name="テキスト ボックス 15">
+                <a:extLst>
+                  <a:ext uri="{FF2B5EF4-FFF2-40B4-BE49-F238E27FC236}">
+                    <a16:creationId xmlns:a16="http://schemas.microsoft.com/office/drawing/2014/main" id="{191B75FC-E209-4FED-97E7-9BC175BE53A9}"/>
+                  </a:ext>
+                </a:extLst>
+              </p:cNvPr>
+              <p:cNvSpPr txBox="1"/>
+              <p:nvPr/>
+            </p:nvSpPr>
+            <p:spPr>
+              <a:xfrm>
+                <a:off x="4243651" y="312297"/>
+                <a:ext cx="3004131" cy="523220"/>
+              </a:xfrm>
+              <a:prstGeom prst="rect">
+                <a:avLst/>
+              </a:prstGeom>
+              <a:noFill/>
+            </p:spPr>
+            <p:txBody>
+              <a:bodyPr wrap="square" rtlCol="0">
+                <a:spAutoFit/>
+              </a:bodyPr>
+              <a:lstStyle/>
+              <a:p>
+                <a:pPr/>
+                <a14:m>
+                  <m:oMathPara xmlns:m="http://schemas.openxmlformats.org/officeDocument/2006/math">
+                    <m:oMathParaPr>
+                      <m:jc m:val="centerGroup"/>
+                    </m:oMathParaPr>
+                    <m:oMath xmlns:m="http://schemas.openxmlformats.org/officeDocument/2006/math">
+                      <m:r>
+                        <a:rPr lang="en-US" altLang="ja-JP" sz="2800" b="1" i="1" smtClean="0">
+                          <a:solidFill>
+                            <a:schemeClr val="tx1">
+                              <a:lumMod val="65000"/>
+                              <a:lumOff val="35000"/>
+                            </a:schemeClr>
+                          </a:solidFill>
+                          <a:latin typeface="Cambria Math" panose="02040503050406030204" pitchFamily="18" charset="0"/>
+                          <a:ea typeface="Meiryo UI" panose="020B0604030504040204" pitchFamily="50" charset="-128"/>
+                        </a:rPr>
+                        <m:t>𝒇𝒓𝒆𝒒</m:t>
+                      </m:r>
+                    </m:oMath>
+                  </m:oMathPara>
+                </a14:m>
+                <a:endParaRPr lang="ja-JP" altLang="en-US" sz="2800" b="1" dirty="0">
+                  <a:solidFill>
+                    <a:schemeClr val="tx1">
+                      <a:lumMod val="65000"/>
+                      <a:lumOff val="35000"/>
+                    </a:schemeClr>
+                  </a:solidFill>
+                  <a:latin typeface="Meiryo UI" panose="020B0604030504040204" pitchFamily="50" charset="-128"/>
+                  <a:ea typeface="Meiryo UI" panose="020B0604030504040204" pitchFamily="50" charset="-128"/>
+                </a:endParaRPr>
+              </a:p>
+            </p:txBody>
+          </p:sp>
+        </mc:Choice>
+        <mc:Fallback>
+          <p:sp>
+            <p:nvSpPr>
+              <p:cNvPr id="16" name="テキスト ボックス 15">
+                <a:extLst>
+                  <a:ext uri="{FF2B5EF4-FFF2-40B4-BE49-F238E27FC236}">
+                    <a16:creationId xmlns:a16="http://schemas.microsoft.com/office/drawing/2014/main" id="{191B75FC-E209-4FED-97E7-9BC175BE53A9}"/>
+                  </a:ext>
+                </a:extLst>
+              </p:cNvPr>
+              <p:cNvSpPr txBox="1">
+                <a:spLocks noRot="1" noChangeAspect="1" noMove="1" noResize="1" noEditPoints="1" noAdjustHandles="1" noChangeArrowheads="1" noChangeShapeType="1" noTextEdit="1"/>
+              </p:cNvSpPr>
+              <p:nvPr/>
+            </p:nvSpPr>
+            <p:spPr>
+              <a:xfrm>
+                <a:off x="4243651" y="312297"/>
+                <a:ext cx="3004131" cy="523220"/>
+              </a:xfrm>
+              <a:prstGeom prst="rect">
+                <a:avLst/>
+              </a:prstGeom>
+              <a:blipFill>
+                <a:blip r:embed="rId3"/>
+                <a:stretch>
+                  <a:fillRect/>
+                </a:stretch>
+              </a:blipFill>
+            </p:spPr>
+            <p:txBody>
+              <a:bodyPr/>
+              <a:lstStyle/>
+              <a:p>
+                <a:r>
+                  <a:rPr lang="ja-JP" altLang="en-US">
+                    <a:noFill/>
+                  </a:rPr>
+                  <a:t> </a:t>
+                </a:r>
+              </a:p>
+            </p:txBody>
+          </p:sp>
+        </mc:Fallback>
+      </mc:AlternateContent>
+      <p:cxnSp>
+        <p:nvCxnSpPr>
+          <p:cNvPr id="17" name="直線コネクタ 16">
+            <a:extLst>
+              <a:ext uri="{FF2B5EF4-FFF2-40B4-BE49-F238E27FC236}">
+                <a16:creationId xmlns:a16="http://schemas.microsoft.com/office/drawing/2014/main" id="{4BCA3557-24A7-48BC-95EF-24A09F3AC118}"/>
+              </a:ext>
+            </a:extLst>
+          </p:cNvPr>
+          <p:cNvCxnSpPr>
+            <a:cxnSpLocks/>
+          </p:cNvCxnSpPr>
+          <p:nvPr/>
+        </p:nvCxnSpPr>
+        <p:spPr>
+          <a:xfrm>
+            <a:off x="6144010" y="3248602"/>
+            <a:ext cx="4313555" cy="0"/>
+          </a:xfrm>
+          <a:prstGeom prst="line">
+            <a:avLst/>
+          </a:prstGeom>
+          <a:ln w="57150">
+            <a:solidFill>
+              <a:schemeClr val="tx1">
+                <a:lumMod val="50000"/>
+                <a:lumOff val="50000"/>
+              </a:schemeClr>
+            </a:solidFill>
+          </a:ln>
+        </p:spPr>
+        <p:style>
+          <a:lnRef idx="1">
+            <a:schemeClr val="dk1"/>
+          </a:lnRef>
+          <a:fillRef idx="0">
+            <a:schemeClr val="dk1"/>
+          </a:fillRef>
+          <a:effectRef idx="0">
+            <a:schemeClr val="dk1"/>
+          </a:effectRef>
+          <a:fontRef idx="minor">
+            <a:schemeClr val="tx1"/>
+          </a:fontRef>
+        </p:style>
+      </p:cxnSp>
+      <p:cxnSp>
+        <p:nvCxnSpPr>
+          <p:cNvPr id="18" name="直線コネクタ 17">
+            <a:extLst>
+              <a:ext uri="{FF2B5EF4-FFF2-40B4-BE49-F238E27FC236}">
+                <a16:creationId xmlns:a16="http://schemas.microsoft.com/office/drawing/2014/main" id="{784390DE-5F6E-44D7-91E7-F378835C2BA9}"/>
+              </a:ext>
+            </a:extLst>
+          </p:cNvPr>
+          <p:cNvCxnSpPr>
+            <a:cxnSpLocks/>
+          </p:cNvCxnSpPr>
+          <p:nvPr/>
+        </p:nvCxnSpPr>
+        <p:spPr>
+          <a:xfrm>
+            <a:off x="6145938" y="2544474"/>
+            <a:ext cx="4313555" cy="0"/>
+          </a:xfrm>
+          <a:prstGeom prst="line">
+            <a:avLst/>
+          </a:prstGeom>
+          <a:ln w="57150">
+            <a:solidFill>
+              <a:schemeClr val="tx1">
+                <a:lumMod val="50000"/>
+                <a:lumOff val="50000"/>
+              </a:schemeClr>
+            </a:solidFill>
+          </a:ln>
+        </p:spPr>
+        <p:style>
+          <a:lnRef idx="1">
+            <a:schemeClr val="dk1"/>
+          </a:lnRef>
+          <a:fillRef idx="0">
+            <a:schemeClr val="dk1"/>
+          </a:fillRef>
+          <a:effectRef idx="0">
+            <a:schemeClr val="dk1"/>
+          </a:effectRef>
+          <a:fontRef idx="minor">
+            <a:schemeClr val="tx1"/>
+          </a:fontRef>
+        </p:style>
+      </p:cxnSp>
+      <p:cxnSp>
+        <p:nvCxnSpPr>
+          <p:cNvPr id="19" name="直線コネクタ 18">
+            <a:extLst>
+              <a:ext uri="{FF2B5EF4-FFF2-40B4-BE49-F238E27FC236}">
+                <a16:creationId xmlns:a16="http://schemas.microsoft.com/office/drawing/2014/main" id="{61FBBAF9-5DDB-4F43-A4CF-3F4AD5F70E43}"/>
+              </a:ext>
+            </a:extLst>
+          </p:cNvPr>
+          <p:cNvCxnSpPr>
+            <a:cxnSpLocks/>
+          </p:cNvCxnSpPr>
+          <p:nvPr/>
+        </p:nvCxnSpPr>
+        <p:spPr>
+          <a:xfrm>
+            <a:off x="6113144" y="1805620"/>
+            <a:ext cx="4313555" cy="0"/>
+          </a:xfrm>
+          <a:prstGeom prst="line">
+            <a:avLst/>
+          </a:prstGeom>
+          <a:ln w="57150">
+            <a:solidFill>
+              <a:schemeClr val="tx1">
+                <a:lumMod val="50000"/>
+                <a:lumOff val="50000"/>
+              </a:schemeClr>
+            </a:solidFill>
+          </a:ln>
+        </p:spPr>
+        <p:style>
+          <a:lnRef idx="1">
+            <a:schemeClr val="dk1"/>
+          </a:lnRef>
+          <a:fillRef idx="0">
+            <a:schemeClr val="dk1"/>
+          </a:fillRef>
+          <a:effectRef idx="0">
+            <a:schemeClr val="dk1"/>
+          </a:effectRef>
+          <a:fontRef idx="minor">
+            <a:schemeClr val="tx1"/>
+          </a:fontRef>
+        </p:style>
+      </p:cxnSp>
+      <p:cxnSp>
+        <p:nvCxnSpPr>
+          <p:cNvPr id="20" name="直線コネクタ 19">
+            <a:extLst>
+              <a:ext uri="{FF2B5EF4-FFF2-40B4-BE49-F238E27FC236}">
+                <a16:creationId xmlns:a16="http://schemas.microsoft.com/office/drawing/2014/main" id="{ECFAF639-8A4F-41F7-B830-08C337D9506D}"/>
+              </a:ext>
+            </a:extLst>
+          </p:cNvPr>
+          <p:cNvCxnSpPr>
+            <a:cxnSpLocks/>
+          </p:cNvCxnSpPr>
+          <p:nvPr/>
+        </p:nvCxnSpPr>
+        <p:spPr>
+          <a:xfrm>
+            <a:off x="6141575" y="1066770"/>
+            <a:ext cx="4313555" cy="0"/>
+          </a:xfrm>
+          <a:prstGeom prst="line">
+            <a:avLst/>
+          </a:prstGeom>
+          <a:ln w="57150">
+            <a:solidFill>
+              <a:schemeClr val="tx1">
+                <a:lumMod val="50000"/>
+                <a:lumOff val="50000"/>
+              </a:schemeClr>
+            </a:solidFill>
+          </a:ln>
+        </p:spPr>
+        <p:style>
+          <a:lnRef idx="1">
+            <a:schemeClr val="dk1"/>
+          </a:lnRef>
+          <a:fillRef idx="0">
+            <a:schemeClr val="dk1"/>
+          </a:fillRef>
+          <a:effectRef idx="0">
+            <a:schemeClr val="dk1"/>
+          </a:effectRef>
+          <a:fontRef idx="minor">
+            <a:schemeClr val="tx1"/>
+          </a:fontRef>
+        </p:style>
+      </p:cxnSp>
+      <p:cxnSp>
+        <p:nvCxnSpPr>
+          <p:cNvPr id="21" name="直線コネクタ 20">
+            <a:extLst>
+              <a:ext uri="{FF2B5EF4-FFF2-40B4-BE49-F238E27FC236}">
+                <a16:creationId xmlns:a16="http://schemas.microsoft.com/office/drawing/2014/main" id="{7D5CA418-9077-47F3-8332-3E9E679014D6}"/>
+              </a:ext>
+            </a:extLst>
+          </p:cNvPr>
+          <p:cNvCxnSpPr>
+            <a:cxnSpLocks/>
+          </p:cNvCxnSpPr>
+          <p:nvPr/>
+        </p:nvCxnSpPr>
+        <p:spPr>
+          <a:xfrm>
+            <a:off x="1108510" y="1091846"/>
+            <a:ext cx="4313555" cy="0"/>
+          </a:xfrm>
+          <a:prstGeom prst="line">
+            <a:avLst/>
+          </a:prstGeom>
+          <a:ln w="57150">
+            <a:solidFill>
+              <a:schemeClr val="tx1">
+                <a:lumMod val="50000"/>
+                <a:lumOff val="50000"/>
+              </a:schemeClr>
+            </a:solidFill>
+          </a:ln>
+        </p:spPr>
+        <p:style>
+          <a:lnRef idx="1">
+            <a:schemeClr val="dk1"/>
+          </a:lnRef>
+          <a:fillRef idx="0">
+            <a:schemeClr val="dk1"/>
+          </a:fillRef>
+          <a:effectRef idx="0">
+            <a:schemeClr val="dk1"/>
+          </a:effectRef>
+          <a:fontRef idx="minor">
+            <a:schemeClr val="tx1"/>
+          </a:fontRef>
+        </p:style>
+      </p:cxnSp>
+      <p:cxnSp>
+        <p:nvCxnSpPr>
+          <p:cNvPr id="22" name="直線コネクタ 21">
+            <a:extLst>
+              <a:ext uri="{FF2B5EF4-FFF2-40B4-BE49-F238E27FC236}">
+                <a16:creationId xmlns:a16="http://schemas.microsoft.com/office/drawing/2014/main" id="{F8AEB1E9-CB99-4D19-84E8-43533B7B055C}"/>
+              </a:ext>
+            </a:extLst>
+          </p:cNvPr>
+          <p:cNvCxnSpPr>
+            <a:cxnSpLocks/>
+          </p:cNvCxnSpPr>
+          <p:nvPr/>
+        </p:nvCxnSpPr>
+        <p:spPr>
+          <a:xfrm>
+            <a:off x="1062790" y="2509166"/>
+            <a:ext cx="4313555" cy="0"/>
+          </a:xfrm>
+          <a:prstGeom prst="line">
+            <a:avLst/>
+          </a:prstGeom>
+          <a:ln w="57150">
+            <a:solidFill>
+              <a:schemeClr val="tx1">
+                <a:lumMod val="50000"/>
+                <a:lumOff val="50000"/>
+              </a:schemeClr>
+            </a:solidFill>
+          </a:ln>
+        </p:spPr>
+        <p:style>
+          <a:lnRef idx="1">
+            <a:schemeClr val="dk1"/>
+          </a:lnRef>
+          <a:fillRef idx="0">
+            <a:schemeClr val="dk1"/>
+          </a:fillRef>
+          <a:effectRef idx="0">
+            <a:schemeClr val="dk1"/>
+          </a:effectRef>
+          <a:fontRef idx="minor">
+            <a:schemeClr val="tx1"/>
+          </a:fontRef>
+        </p:style>
+      </p:cxnSp>
+      <p:cxnSp>
+        <p:nvCxnSpPr>
+          <p:cNvPr id="23" name="直線コネクタ 22">
+            <a:extLst>
+              <a:ext uri="{FF2B5EF4-FFF2-40B4-BE49-F238E27FC236}">
+                <a16:creationId xmlns:a16="http://schemas.microsoft.com/office/drawing/2014/main" id="{998F1FA5-A43F-44C4-B3A5-A69696783308}"/>
+              </a:ext>
+            </a:extLst>
+          </p:cNvPr>
+          <p:cNvCxnSpPr>
+            <a:cxnSpLocks/>
+          </p:cNvCxnSpPr>
+          <p:nvPr/>
+        </p:nvCxnSpPr>
+        <p:spPr>
+          <a:xfrm>
+            <a:off x="1803400" y="1072599"/>
+            <a:ext cx="0" cy="2868555"/>
+          </a:xfrm>
+          <a:prstGeom prst="line">
+            <a:avLst/>
+          </a:prstGeom>
+          <a:ln w="57150">
+            <a:solidFill>
+              <a:schemeClr val="tx1">
+                <a:lumMod val="50000"/>
+                <a:lumOff val="50000"/>
+              </a:schemeClr>
+            </a:solidFill>
+          </a:ln>
+        </p:spPr>
+        <p:style>
+          <a:lnRef idx="1">
+            <a:schemeClr val="dk1"/>
+          </a:lnRef>
+          <a:fillRef idx="0">
+            <a:schemeClr val="dk1"/>
+          </a:fillRef>
+          <a:effectRef idx="0">
+            <a:schemeClr val="dk1"/>
+          </a:effectRef>
+          <a:fontRef idx="minor">
+            <a:schemeClr val="tx1"/>
+          </a:fontRef>
+        </p:style>
+      </p:cxnSp>
+      <p:cxnSp>
+        <p:nvCxnSpPr>
+          <p:cNvPr id="25" name="直線コネクタ 24">
+            <a:extLst>
+              <a:ext uri="{FF2B5EF4-FFF2-40B4-BE49-F238E27FC236}">
+                <a16:creationId xmlns:a16="http://schemas.microsoft.com/office/drawing/2014/main" id="{A5FE4007-03CB-42D9-AE67-DCD3B4F19322}"/>
+              </a:ext>
+            </a:extLst>
+          </p:cNvPr>
+          <p:cNvCxnSpPr>
+            <a:cxnSpLocks/>
+          </p:cNvCxnSpPr>
+          <p:nvPr/>
+        </p:nvCxnSpPr>
+        <p:spPr>
+          <a:xfrm>
+            <a:off x="2519680" y="1103079"/>
+            <a:ext cx="0" cy="2868555"/>
+          </a:xfrm>
+          <a:prstGeom prst="line">
+            <a:avLst/>
+          </a:prstGeom>
+          <a:ln w="57150">
+            <a:solidFill>
+              <a:schemeClr val="tx1">
+                <a:lumMod val="50000"/>
+                <a:lumOff val="50000"/>
+              </a:schemeClr>
+            </a:solidFill>
+          </a:ln>
+        </p:spPr>
+        <p:style>
+          <a:lnRef idx="1">
+            <a:schemeClr val="dk1"/>
+          </a:lnRef>
+          <a:fillRef idx="0">
+            <a:schemeClr val="dk1"/>
+          </a:fillRef>
+          <a:effectRef idx="0">
+            <a:schemeClr val="dk1"/>
+          </a:effectRef>
+          <a:fontRef idx="minor">
+            <a:schemeClr val="tx1"/>
+          </a:fontRef>
+        </p:style>
+      </p:cxnSp>
+      <p:cxnSp>
+        <p:nvCxnSpPr>
+          <p:cNvPr id="26" name="直線コネクタ 25">
+            <a:extLst>
+              <a:ext uri="{FF2B5EF4-FFF2-40B4-BE49-F238E27FC236}">
+                <a16:creationId xmlns:a16="http://schemas.microsoft.com/office/drawing/2014/main" id="{680DC72D-BB56-43AB-B740-E0FCF2838A13}"/>
+              </a:ext>
+            </a:extLst>
+          </p:cNvPr>
+          <p:cNvCxnSpPr>
+            <a:cxnSpLocks/>
+          </p:cNvCxnSpPr>
+          <p:nvPr/>
+        </p:nvCxnSpPr>
+        <p:spPr>
+          <a:xfrm>
+            <a:off x="3251200" y="1072599"/>
+            <a:ext cx="0" cy="2868555"/>
+          </a:xfrm>
+          <a:prstGeom prst="line">
+            <a:avLst/>
+          </a:prstGeom>
+          <a:ln w="57150">
+            <a:solidFill>
+              <a:schemeClr val="tx1">
+                <a:lumMod val="50000"/>
+                <a:lumOff val="50000"/>
+              </a:schemeClr>
+            </a:solidFill>
+          </a:ln>
+        </p:spPr>
+        <p:style>
+          <a:lnRef idx="1">
+            <a:schemeClr val="dk1"/>
+          </a:lnRef>
+          <a:fillRef idx="0">
+            <a:schemeClr val="dk1"/>
+          </a:fillRef>
+          <a:effectRef idx="0">
+            <a:schemeClr val="dk1"/>
+          </a:effectRef>
+          <a:fontRef idx="minor">
+            <a:schemeClr val="tx1"/>
+          </a:fontRef>
+        </p:style>
+      </p:cxnSp>
+      <p:cxnSp>
+        <p:nvCxnSpPr>
+          <p:cNvPr id="27" name="直線コネクタ 26">
+            <a:extLst>
+              <a:ext uri="{FF2B5EF4-FFF2-40B4-BE49-F238E27FC236}">
+                <a16:creationId xmlns:a16="http://schemas.microsoft.com/office/drawing/2014/main" id="{FAE1D2AE-2B60-460F-87DB-5F0306DCA492}"/>
+              </a:ext>
+            </a:extLst>
+          </p:cNvPr>
+          <p:cNvCxnSpPr>
+            <a:cxnSpLocks/>
+          </p:cNvCxnSpPr>
+          <p:nvPr/>
+        </p:nvCxnSpPr>
+        <p:spPr>
+          <a:xfrm>
+            <a:off x="3997960" y="1072599"/>
+            <a:ext cx="0" cy="2868555"/>
+          </a:xfrm>
+          <a:prstGeom prst="line">
+            <a:avLst/>
+          </a:prstGeom>
+          <a:ln w="57150">
+            <a:solidFill>
+              <a:schemeClr val="tx1">
+                <a:lumMod val="50000"/>
+                <a:lumOff val="50000"/>
+              </a:schemeClr>
+            </a:solidFill>
+          </a:ln>
+        </p:spPr>
+        <p:style>
+          <a:lnRef idx="1">
+            <a:schemeClr val="dk1"/>
+          </a:lnRef>
+          <a:fillRef idx="0">
+            <a:schemeClr val="dk1"/>
+          </a:fillRef>
+          <a:effectRef idx="0">
+            <a:schemeClr val="dk1"/>
+          </a:effectRef>
+          <a:fontRef idx="minor">
+            <a:schemeClr val="tx1"/>
+          </a:fontRef>
+        </p:style>
+      </p:cxnSp>
+      <p:cxnSp>
+        <p:nvCxnSpPr>
+          <p:cNvPr id="28" name="直線コネクタ 27">
+            <a:extLst>
+              <a:ext uri="{FF2B5EF4-FFF2-40B4-BE49-F238E27FC236}">
+                <a16:creationId xmlns:a16="http://schemas.microsoft.com/office/drawing/2014/main" id="{08B9D07B-0A1F-477D-B0D6-39BE17D482D3}"/>
+              </a:ext>
+            </a:extLst>
+          </p:cNvPr>
+          <p:cNvCxnSpPr>
+            <a:cxnSpLocks/>
+          </p:cNvCxnSpPr>
+          <p:nvPr/>
+        </p:nvCxnSpPr>
+        <p:spPr>
+          <a:xfrm>
+            <a:off x="4683760" y="1103079"/>
+            <a:ext cx="0" cy="2868555"/>
+          </a:xfrm>
+          <a:prstGeom prst="line">
+            <a:avLst/>
+          </a:prstGeom>
+          <a:ln w="57150">
+            <a:solidFill>
+              <a:schemeClr val="tx1">
+                <a:lumMod val="50000"/>
+                <a:lumOff val="50000"/>
+              </a:schemeClr>
+            </a:solidFill>
+          </a:ln>
+        </p:spPr>
+        <p:style>
+          <a:lnRef idx="1">
+            <a:schemeClr val="dk1"/>
+          </a:lnRef>
+          <a:fillRef idx="0">
+            <a:schemeClr val="dk1"/>
+          </a:fillRef>
+          <a:effectRef idx="0">
+            <a:schemeClr val="dk1"/>
+          </a:effectRef>
+          <a:fontRef idx="minor">
+            <a:schemeClr val="tx1"/>
+          </a:fontRef>
+        </p:style>
+      </p:cxnSp>
+      <p:cxnSp>
+        <p:nvCxnSpPr>
+          <p:cNvPr id="29" name="直線コネクタ 28">
+            <a:extLst>
+              <a:ext uri="{FF2B5EF4-FFF2-40B4-BE49-F238E27FC236}">
+                <a16:creationId xmlns:a16="http://schemas.microsoft.com/office/drawing/2014/main" id="{D8908E6D-EC86-4055-A9E8-4B43A593C1C6}"/>
+              </a:ext>
+            </a:extLst>
+          </p:cNvPr>
+          <p:cNvCxnSpPr>
+            <a:cxnSpLocks/>
+          </p:cNvCxnSpPr>
+          <p:nvPr/>
+        </p:nvCxnSpPr>
+        <p:spPr>
+          <a:xfrm>
+            <a:off x="9057640" y="1072599"/>
+            <a:ext cx="0" cy="2868555"/>
+          </a:xfrm>
+          <a:prstGeom prst="line">
+            <a:avLst/>
+          </a:prstGeom>
+          <a:ln w="57150">
+            <a:solidFill>
+              <a:schemeClr val="tx1">
+                <a:lumMod val="50000"/>
+                <a:lumOff val="50000"/>
+              </a:schemeClr>
+            </a:solidFill>
+          </a:ln>
+        </p:spPr>
+        <p:style>
+          <a:lnRef idx="1">
+            <a:schemeClr val="dk1"/>
+          </a:lnRef>
+          <a:fillRef idx="0">
+            <a:schemeClr val="dk1"/>
+          </a:fillRef>
+          <a:effectRef idx="0">
+            <a:schemeClr val="dk1"/>
+          </a:effectRef>
+          <a:fontRef idx="minor">
+            <a:schemeClr val="tx1"/>
+          </a:fontRef>
+        </p:style>
+      </p:cxnSp>
+      <p:cxnSp>
+        <p:nvCxnSpPr>
+          <p:cNvPr id="30" name="直線コネクタ 29">
+            <a:extLst>
+              <a:ext uri="{FF2B5EF4-FFF2-40B4-BE49-F238E27FC236}">
+                <a16:creationId xmlns:a16="http://schemas.microsoft.com/office/drawing/2014/main" id="{D725B9B1-85B4-4CCE-9E0E-C33EDF594615}"/>
+              </a:ext>
+            </a:extLst>
+          </p:cNvPr>
+          <p:cNvCxnSpPr>
+            <a:cxnSpLocks/>
+          </p:cNvCxnSpPr>
+          <p:nvPr/>
+        </p:nvCxnSpPr>
+        <p:spPr>
+          <a:xfrm>
+            <a:off x="10444480" y="1034499"/>
+            <a:ext cx="0" cy="2921895"/>
+          </a:xfrm>
+          <a:prstGeom prst="line">
+            <a:avLst/>
+          </a:prstGeom>
+          <a:ln w="57150">
+            <a:solidFill>
+              <a:schemeClr val="tx1">
+                <a:lumMod val="50000"/>
+                <a:lumOff val="50000"/>
+              </a:schemeClr>
+            </a:solidFill>
+          </a:ln>
+        </p:spPr>
+        <p:style>
+          <a:lnRef idx="1">
+            <a:schemeClr val="dk1"/>
+          </a:lnRef>
+          <a:fillRef idx="0">
+            <a:schemeClr val="dk1"/>
+          </a:fillRef>
+          <a:effectRef idx="0">
+            <a:schemeClr val="dk1"/>
+          </a:effectRef>
+          <a:fontRef idx="minor">
+            <a:schemeClr val="tx1"/>
+          </a:fontRef>
+        </p:style>
+      </p:cxnSp>
+      <p:cxnSp>
+        <p:nvCxnSpPr>
+          <p:cNvPr id="31" name="直線コネクタ 30">
+            <a:extLst>
+              <a:ext uri="{FF2B5EF4-FFF2-40B4-BE49-F238E27FC236}">
+                <a16:creationId xmlns:a16="http://schemas.microsoft.com/office/drawing/2014/main" id="{2C8C7492-62D0-494C-B9D9-651A7EB89E8E}"/>
+              </a:ext>
+            </a:extLst>
+          </p:cNvPr>
+          <p:cNvCxnSpPr>
+            <a:cxnSpLocks/>
+          </p:cNvCxnSpPr>
+          <p:nvPr/>
+        </p:nvCxnSpPr>
+        <p:spPr>
+          <a:xfrm>
+            <a:off x="7594600" y="1087839"/>
+            <a:ext cx="0" cy="2868555"/>
+          </a:xfrm>
+          <a:prstGeom prst="line">
+            <a:avLst/>
+          </a:prstGeom>
+          <a:ln w="57150">
+            <a:solidFill>
+              <a:schemeClr val="tx1">
+                <a:lumMod val="50000"/>
+                <a:lumOff val="50000"/>
+              </a:schemeClr>
+            </a:solidFill>
+          </a:ln>
+        </p:spPr>
+        <p:style>
+          <a:lnRef idx="1">
+            <a:schemeClr val="dk1"/>
+          </a:lnRef>
+          <a:fillRef idx="0">
+            <a:schemeClr val="dk1"/>
+          </a:fillRef>
+          <a:effectRef idx="0">
+            <a:schemeClr val="dk1"/>
+          </a:effectRef>
+          <a:fontRef idx="minor">
+            <a:schemeClr val="tx1"/>
+          </a:fontRef>
+        </p:style>
+      </p:cxnSp>
+      <p:cxnSp>
+        <p:nvCxnSpPr>
+          <p:cNvPr id="32" name="直線コネクタ 31">
+            <a:extLst>
+              <a:ext uri="{FF2B5EF4-FFF2-40B4-BE49-F238E27FC236}">
+                <a16:creationId xmlns:a16="http://schemas.microsoft.com/office/drawing/2014/main" id="{1423CCA6-8C20-4DE3-984D-CB399EFCBAF0}"/>
+              </a:ext>
+            </a:extLst>
+          </p:cNvPr>
+          <p:cNvCxnSpPr>
+            <a:cxnSpLocks/>
+          </p:cNvCxnSpPr>
+          <p:nvPr/>
+        </p:nvCxnSpPr>
+        <p:spPr>
+          <a:xfrm>
+            <a:off x="5384800" y="1118319"/>
+            <a:ext cx="14877" cy="2853315"/>
+          </a:xfrm>
+          <a:prstGeom prst="line">
+            <a:avLst/>
+          </a:prstGeom>
+          <a:ln w="57150">
+            <a:solidFill>
+              <a:schemeClr val="tx1">
+                <a:lumMod val="50000"/>
+                <a:lumOff val="50000"/>
+              </a:schemeClr>
+            </a:solidFill>
+          </a:ln>
+        </p:spPr>
+        <p:style>
+          <a:lnRef idx="1">
+            <a:schemeClr val="dk1"/>
+          </a:lnRef>
+          <a:fillRef idx="0">
+            <a:schemeClr val="dk1"/>
+          </a:fillRef>
+          <a:effectRef idx="0">
+            <a:schemeClr val="dk1"/>
+          </a:effectRef>
+          <a:fontRef idx="minor">
+            <a:schemeClr val="tx1"/>
+          </a:fontRef>
+        </p:style>
+      </p:cxnSp>
+      <mc:AlternateContent xmlns:mc="http://schemas.openxmlformats.org/markup-compatibility/2006">
+        <mc:Choice xmlns:a14="http://schemas.microsoft.com/office/drawing/2010/main" Requires="a14">
+          <p:sp>
+            <p:nvSpPr>
+              <p:cNvPr id="33" name="テキスト ボックス 32">
+                <a:extLst>
+                  <a:ext uri="{FF2B5EF4-FFF2-40B4-BE49-F238E27FC236}">
+                    <a16:creationId xmlns:a16="http://schemas.microsoft.com/office/drawing/2014/main" id="{D14964B8-4FFA-42F1-BB28-DF5EF506B4C5}"/>
+                  </a:ext>
+                </a:extLst>
+              </p:cNvPr>
+              <p:cNvSpPr txBox="1"/>
+              <p:nvPr/>
+            </p:nvSpPr>
+            <p:spPr>
+              <a:xfrm>
+                <a:off x="8520939" y="3939076"/>
+                <a:ext cx="3004131" cy="525913"/>
+              </a:xfrm>
+              <a:prstGeom prst="rect">
+                <a:avLst/>
+              </a:prstGeom>
+              <a:noFill/>
+            </p:spPr>
+            <p:txBody>
+              <a:bodyPr wrap="square" rtlCol="0">
+                <a:spAutoFit/>
+              </a:bodyPr>
+              <a:lstStyle/>
+              <a:p>
+                <a:pPr/>
+                <a14:m>
+                  <m:oMathPara xmlns:m="http://schemas.openxmlformats.org/officeDocument/2006/math">
+                    <m:oMathParaPr>
+                      <m:jc m:val="centerGroup"/>
+                    </m:oMathParaPr>
+                    <m:oMath xmlns:m="http://schemas.openxmlformats.org/officeDocument/2006/math">
+                      <m:r>
+                        <a:rPr lang="en-US" altLang="ja-JP" sz="2800" b="1" i="1" smtClean="0">
+                          <a:solidFill>
+                            <a:schemeClr val="tx1">
+                              <a:lumMod val="65000"/>
+                              <a:lumOff val="35000"/>
+                            </a:schemeClr>
+                          </a:solidFill>
+                          <a:latin typeface="Cambria Math" panose="02040503050406030204" pitchFamily="18" charset="0"/>
+                          <a:ea typeface="Meiryo UI" panose="020B0604030504040204" pitchFamily="50" charset="-128"/>
+                        </a:rPr>
+                        <m:t>𝒕𝒊𝒎𝒆</m:t>
+                      </m:r>
+                    </m:oMath>
+                  </m:oMathPara>
+                </a14:m>
+                <a:endParaRPr lang="ja-JP" altLang="en-US" sz="2800" b="1" dirty="0">
+                  <a:solidFill>
+                    <a:schemeClr val="tx1">
+                      <a:lumMod val="65000"/>
+                      <a:lumOff val="35000"/>
+                    </a:schemeClr>
+                  </a:solidFill>
+                  <a:latin typeface="Meiryo UI" panose="020B0604030504040204" pitchFamily="50" charset="-128"/>
+                  <a:ea typeface="Meiryo UI" panose="020B0604030504040204" pitchFamily="50" charset="-128"/>
+                </a:endParaRPr>
+              </a:p>
+            </p:txBody>
+          </p:sp>
+        </mc:Choice>
+        <mc:Fallback>
+          <p:sp>
+            <p:nvSpPr>
+              <p:cNvPr id="33" name="テキスト ボックス 32">
+                <a:extLst>
+                  <a:ext uri="{FF2B5EF4-FFF2-40B4-BE49-F238E27FC236}">
+                    <a16:creationId xmlns:a16="http://schemas.microsoft.com/office/drawing/2014/main" id="{D14964B8-4FFA-42F1-BB28-DF5EF506B4C5}"/>
+                  </a:ext>
+                </a:extLst>
+              </p:cNvPr>
+              <p:cNvSpPr txBox="1">
+                <a:spLocks noRot="1" noChangeAspect="1" noMove="1" noResize="1" noEditPoints="1" noAdjustHandles="1" noChangeArrowheads="1" noChangeShapeType="1" noTextEdit="1"/>
+              </p:cNvSpPr>
+              <p:nvPr/>
+            </p:nvSpPr>
+            <p:spPr>
+              <a:xfrm>
+                <a:off x="8520939" y="3939076"/>
+                <a:ext cx="3004131" cy="525913"/>
+              </a:xfrm>
+              <a:prstGeom prst="rect">
+                <a:avLst/>
+              </a:prstGeom>
+              <a:blipFill>
+                <a:blip r:embed="rId4"/>
+                <a:stretch>
+                  <a:fillRect/>
+                </a:stretch>
+              </a:blipFill>
+            </p:spPr>
+            <p:txBody>
+              <a:bodyPr/>
+              <a:lstStyle/>
+              <a:p>
+                <a:r>
+                  <a:rPr lang="ja-JP" altLang="en-US">
+                    <a:noFill/>
+                  </a:rPr>
+                  <a:t> </a:t>
+                </a:r>
+              </a:p>
+            </p:txBody>
+          </p:sp>
+        </mc:Fallback>
+      </mc:AlternateContent>
+      <mc:AlternateContent xmlns:mc="http://schemas.openxmlformats.org/markup-compatibility/2006">
+        <mc:Choice xmlns:a14="http://schemas.microsoft.com/office/drawing/2010/main" Requires="a14">
+          <p:sp>
+            <p:nvSpPr>
+              <p:cNvPr id="34" name="テキスト ボックス 33">
+                <a:extLst>
+                  <a:ext uri="{FF2B5EF4-FFF2-40B4-BE49-F238E27FC236}">
+                    <a16:creationId xmlns:a16="http://schemas.microsoft.com/office/drawing/2014/main" id="{9AF6BE2F-F9BC-4D7B-AA95-0327B948939C}"/>
+                  </a:ext>
+                </a:extLst>
+              </p:cNvPr>
+              <p:cNvSpPr txBox="1"/>
+              <p:nvPr/>
+            </p:nvSpPr>
+            <p:spPr>
+              <a:xfrm>
+                <a:off x="3410384" y="3939076"/>
+                <a:ext cx="3004131" cy="525913"/>
+              </a:xfrm>
+              <a:prstGeom prst="rect">
+                <a:avLst/>
+              </a:prstGeom>
+              <a:noFill/>
+            </p:spPr>
+            <p:txBody>
+              <a:bodyPr wrap="square" rtlCol="0">
+                <a:spAutoFit/>
+              </a:bodyPr>
+              <a:lstStyle/>
+              <a:p>
+                <a:pPr/>
+                <a14:m>
+                  <m:oMathPara xmlns:m="http://schemas.openxmlformats.org/officeDocument/2006/math">
+                    <m:oMathParaPr>
+                      <m:jc m:val="centerGroup"/>
+                    </m:oMathParaPr>
+                    <m:oMath xmlns:m="http://schemas.openxmlformats.org/officeDocument/2006/math">
+                      <m:r>
+                        <a:rPr lang="en-US" altLang="ja-JP" sz="2800" b="1" i="1" smtClean="0">
+                          <a:solidFill>
+                            <a:schemeClr val="tx1">
+                              <a:lumMod val="65000"/>
+                              <a:lumOff val="35000"/>
+                            </a:schemeClr>
+                          </a:solidFill>
+                          <a:latin typeface="Cambria Math" panose="02040503050406030204" pitchFamily="18" charset="0"/>
+                          <a:ea typeface="Meiryo UI" panose="020B0604030504040204" pitchFamily="50" charset="-128"/>
+                        </a:rPr>
+                        <m:t>𝒕𝒊𝒎𝒆</m:t>
+                      </m:r>
+                    </m:oMath>
+                  </m:oMathPara>
+                </a14:m>
+                <a:endParaRPr lang="ja-JP" altLang="en-US" sz="2800" b="1" dirty="0">
+                  <a:solidFill>
+                    <a:schemeClr val="tx1">
+                      <a:lumMod val="65000"/>
+                      <a:lumOff val="35000"/>
+                    </a:schemeClr>
+                  </a:solidFill>
+                  <a:latin typeface="Meiryo UI" panose="020B0604030504040204" pitchFamily="50" charset="-128"/>
+                  <a:ea typeface="Meiryo UI" panose="020B0604030504040204" pitchFamily="50" charset="-128"/>
+                </a:endParaRPr>
+              </a:p>
+            </p:txBody>
+          </p:sp>
+        </mc:Choice>
+        <mc:Fallback>
+          <p:sp>
+            <p:nvSpPr>
+              <p:cNvPr id="34" name="テキスト ボックス 33">
+                <a:extLst>
+                  <a:ext uri="{FF2B5EF4-FFF2-40B4-BE49-F238E27FC236}">
+                    <a16:creationId xmlns:a16="http://schemas.microsoft.com/office/drawing/2014/main" id="{9AF6BE2F-F9BC-4D7B-AA95-0327B948939C}"/>
+                  </a:ext>
+                </a:extLst>
+              </p:cNvPr>
+              <p:cNvSpPr txBox="1">
+                <a:spLocks noRot="1" noChangeAspect="1" noMove="1" noResize="1" noEditPoints="1" noAdjustHandles="1" noChangeArrowheads="1" noChangeShapeType="1" noTextEdit="1"/>
+              </p:cNvSpPr>
+              <p:nvPr/>
+            </p:nvSpPr>
+            <p:spPr>
+              <a:xfrm>
+                <a:off x="3410384" y="3939076"/>
+                <a:ext cx="3004131" cy="525913"/>
+              </a:xfrm>
+              <a:prstGeom prst="rect">
+                <a:avLst/>
+              </a:prstGeom>
+              <a:blipFill>
+                <a:blip r:embed="rId5"/>
+                <a:stretch>
+                  <a:fillRect/>
+                </a:stretch>
+              </a:blipFill>
+            </p:spPr>
+            <p:txBody>
+              <a:bodyPr/>
+              <a:lstStyle/>
+              <a:p>
+                <a:r>
+                  <a:rPr lang="ja-JP" altLang="en-US">
+                    <a:noFill/>
+                  </a:rPr>
+                  <a:t> </a:t>
+                </a:r>
+              </a:p>
+            </p:txBody>
+          </p:sp>
+        </mc:Fallback>
+      </mc:AlternateContent>
+    </p:spTree>
+    <p:extLst>
+      <p:ext uri="{BB962C8B-B14F-4D97-AF65-F5344CB8AC3E}">
+        <p14:creationId xmlns:p14="http://schemas.microsoft.com/office/powerpoint/2010/main" val="2745388288"/>
       </p:ext>
     </p:extLst>
   </p:cSld>

</xml_diff>

<commit_message>
major update!!! added STFT,WT,HT,ERP,PLI,PSI
</commit_message>
<xml_diff>
--- a/figures/figure.pptx
+++ b/figures/figure.pptx
@@ -261,7 +261,7 @@
           <a:p>
             <a:fld id="{D9812761-E0F9-498D-A86D-14F66CBFAB0E}" type="datetimeFigureOut">
               <a:rPr kumimoji="1" lang="ja-JP" altLang="en-US" smtClean="0"/>
-              <a:t>2021/7/5</a:t>
+              <a:t>2021/7/6</a:t>
             </a:fld>
             <a:endParaRPr kumimoji="1" lang="ja-JP" altLang="en-US"/>
           </a:p>
@@ -463,7 +463,7 @@
           <a:p>
             <a:fld id="{D9812761-E0F9-498D-A86D-14F66CBFAB0E}" type="datetimeFigureOut">
               <a:rPr kumimoji="1" lang="ja-JP" altLang="en-US" smtClean="0"/>
-              <a:t>2021/7/5</a:t>
+              <a:t>2021/7/6</a:t>
             </a:fld>
             <a:endParaRPr kumimoji="1" lang="ja-JP" altLang="en-US"/>
           </a:p>
@@ -675,7 +675,7 @@
           <a:p>
             <a:fld id="{D9812761-E0F9-498D-A86D-14F66CBFAB0E}" type="datetimeFigureOut">
               <a:rPr kumimoji="1" lang="ja-JP" altLang="en-US" smtClean="0"/>
-              <a:t>2021/7/5</a:t>
+              <a:t>2021/7/6</a:t>
             </a:fld>
             <a:endParaRPr kumimoji="1" lang="ja-JP" altLang="en-US"/>
           </a:p>
@@ -877,7 +877,7 @@
           <a:p>
             <a:fld id="{D9812761-E0F9-498D-A86D-14F66CBFAB0E}" type="datetimeFigureOut">
               <a:rPr kumimoji="1" lang="ja-JP" altLang="en-US" smtClean="0"/>
-              <a:t>2021/7/5</a:t>
+              <a:t>2021/7/6</a:t>
             </a:fld>
             <a:endParaRPr kumimoji="1" lang="ja-JP" altLang="en-US"/>
           </a:p>
@@ -1121,7 +1121,7 @@
           <a:p>
             <a:fld id="{D9812761-E0F9-498D-A86D-14F66CBFAB0E}" type="datetimeFigureOut">
               <a:rPr kumimoji="1" lang="ja-JP" altLang="en-US" smtClean="0"/>
-              <a:t>2021/7/5</a:t>
+              <a:t>2021/7/6</a:t>
             </a:fld>
             <a:endParaRPr kumimoji="1" lang="ja-JP" altLang="en-US"/>
           </a:p>
@@ -1417,7 +1417,7 @@
           <a:p>
             <a:fld id="{D9812761-E0F9-498D-A86D-14F66CBFAB0E}" type="datetimeFigureOut">
               <a:rPr kumimoji="1" lang="ja-JP" altLang="en-US" smtClean="0"/>
-              <a:t>2021/7/5</a:t>
+              <a:t>2021/7/6</a:t>
             </a:fld>
             <a:endParaRPr kumimoji="1" lang="ja-JP" altLang="en-US"/>
           </a:p>
@@ -1848,7 +1848,7 @@
           <a:p>
             <a:fld id="{D9812761-E0F9-498D-A86D-14F66CBFAB0E}" type="datetimeFigureOut">
               <a:rPr kumimoji="1" lang="ja-JP" altLang="en-US" smtClean="0"/>
-              <a:t>2021/7/5</a:t>
+              <a:t>2021/7/6</a:t>
             </a:fld>
             <a:endParaRPr kumimoji="1" lang="ja-JP" altLang="en-US"/>
           </a:p>
@@ -1966,7 +1966,7 @@
           <a:p>
             <a:fld id="{D9812761-E0F9-498D-A86D-14F66CBFAB0E}" type="datetimeFigureOut">
               <a:rPr kumimoji="1" lang="ja-JP" altLang="en-US" smtClean="0"/>
-              <a:t>2021/7/5</a:t>
+              <a:t>2021/7/6</a:t>
             </a:fld>
             <a:endParaRPr kumimoji="1" lang="ja-JP" altLang="en-US"/>
           </a:p>
@@ -2061,7 +2061,7 @@
           <a:p>
             <a:fld id="{D9812761-E0F9-498D-A86D-14F66CBFAB0E}" type="datetimeFigureOut">
               <a:rPr kumimoji="1" lang="ja-JP" altLang="en-US" smtClean="0"/>
-              <a:t>2021/7/5</a:t>
+              <a:t>2021/7/6</a:t>
             </a:fld>
             <a:endParaRPr kumimoji="1" lang="ja-JP" altLang="en-US"/>
           </a:p>
@@ -2370,7 +2370,7 @@
           <a:p>
             <a:fld id="{D9812761-E0F9-498D-A86D-14F66CBFAB0E}" type="datetimeFigureOut">
               <a:rPr kumimoji="1" lang="ja-JP" altLang="en-US" smtClean="0"/>
-              <a:t>2021/7/5</a:t>
+              <a:t>2021/7/6</a:t>
             </a:fld>
             <a:endParaRPr kumimoji="1" lang="ja-JP" altLang="en-US"/>
           </a:p>
@@ -2627,7 +2627,7 @@
           <a:p>
             <a:fld id="{D9812761-E0F9-498D-A86D-14F66CBFAB0E}" type="datetimeFigureOut">
               <a:rPr kumimoji="1" lang="ja-JP" altLang="en-US" smtClean="0"/>
-              <a:t>2021/7/5</a:t>
+              <a:t>2021/7/6</a:t>
             </a:fld>
             <a:endParaRPr kumimoji="1" lang="ja-JP" altLang="en-US"/>
           </a:p>
@@ -2872,7 +2872,7 @@
           <a:p>
             <a:fld id="{D9812761-E0F9-498D-A86D-14F66CBFAB0E}" type="datetimeFigureOut">
               <a:rPr kumimoji="1" lang="ja-JP" altLang="en-US" smtClean="0"/>
-              <a:t>2021/7/5</a:t>
+              <a:t>2021/7/6</a:t>
             </a:fld>
             <a:endParaRPr kumimoji="1" lang="ja-JP" altLang="en-US"/>
           </a:p>
@@ -9292,8 +9292,8 @@
           </a:fontRef>
         </p:style>
       </p:cxnSp>
-      <mc:AlternateContent xmlns:mc="http://schemas.openxmlformats.org/markup-compatibility/2006">
-        <mc:Choice xmlns:a14="http://schemas.microsoft.com/office/drawing/2010/main" Requires="a14">
+      <mc:AlternateContent xmlns:mc="http://schemas.openxmlformats.org/markup-compatibility/2006" xmlns:a14="http://schemas.microsoft.com/office/drawing/2010/main">
+        <mc:Choice Requires="a14">
           <p:sp>
             <p:nvSpPr>
               <p:cNvPr id="8" name="テキスト ボックス 7">
@@ -9359,7 +9359,7 @@
             </p:txBody>
           </p:sp>
         </mc:Choice>
-        <mc:Fallback>
+        <mc:Fallback xmlns="">
           <p:sp>
             <p:nvSpPr>
               <p:cNvPr id="8" name="テキスト ボックス 7">
@@ -9496,8 +9496,8 @@
           </a:fontRef>
         </p:style>
       </p:cxnSp>
-      <mc:AlternateContent xmlns:mc="http://schemas.openxmlformats.org/markup-compatibility/2006">
-        <mc:Choice xmlns:a14="http://schemas.microsoft.com/office/drawing/2010/main" Requires="a14">
+      <mc:AlternateContent xmlns:mc="http://schemas.openxmlformats.org/markup-compatibility/2006" xmlns:a14="http://schemas.microsoft.com/office/drawing/2010/main">
+        <mc:Choice Requires="a14">
           <p:sp>
             <p:nvSpPr>
               <p:cNvPr id="16" name="テキスト ボックス 15">
@@ -9563,7 +9563,7 @@
             </p:txBody>
           </p:sp>
         </mc:Choice>
-        <mc:Fallback>
+        <mc:Fallback xmlns="">
           <p:sp>
             <p:nvSpPr>
               <p:cNvPr id="16" name="テキスト ボックス 15">
@@ -10298,8 +10298,8 @@
           </a:fontRef>
         </p:style>
       </p:cxnSp>
-      <mc:AlternateContent xmlns:mc="http://schemas.openxmlformats.org/markup-compatibility/2006">
-        <mc:Choice xmlns:a14="http://schemas.microsoft.com/office/drawing/2010/main" Requires="a14">
+      <mc:AlternateContent xmlns:mc="http://schemas.openxmlformats.org/markup-compatibility/2006" xmlns:a14="http://schemas.microsoft.com/office/drawing/2010/main">
+        <mc:Choice Requires="a14">
           <p:sp>
             <p:nvSpPr>
               <p:cNvPr id="33" name="テキスト ボックス 32">
@@ -10365,7 +10365,7 @@
             </p:txBody>
           </p:sp>
         </mc:Choice>
-        <mc:Fallback>
+        <mc:Fallback xmlns="">
           <p:sp>
             <p:nvSpPr>
               <p:cNvPr id="33" name="テキスト ボックス 32">
@@ -10410,8 +10410,8 @@
           </p:sp>
         </mc:Fallback>
       </mc:AlternateContent>
-      <mc:AlternateContent xmlns:mc="http://schemas.openxmlformats.org/markup-compatibility/2006">
-        <mc:Choice xmlns:a14="http://schemas.microsoft.com/office/drawing/2010/main" Requires="a14">
+      <mc:AlternateContent xmlns:mc="http://schemas.openxmlformats.org/markup-compatibility/2006" xmlns:a14="http://schemas.microsoft.com/office/drawing/2010/main">
+        <mc:Choice Requires="a14">
           <p:sp>
             <p:nvSpPr>
               <p:cNvPr id="34" name="テキスト ボックス 33">
@@ -10477,7 +10477,7 @@
             </p:txBody>
           </p:sp>
         </mc:Choice>
-        <mc:Fallback>
+        <mc:Fallback xmlns="">
           <p:sp>
             <p:nvSpPr>
               <p:cNvPr id="34" name="テキスト ボックス 33">
@@ -10502,6 +10502,1058 @@
               </a:prstGeom>
               <a:blipFill>
                 <a:blip r:embed="rId5"/>
+                <a:stretch>
+                  <a:fillRect/>
+                </a:stretch>
+              </a:blipFill>
+            </p:spPr>
+            <p:txBody>
+              <a:bodyPr/>
+              <a:lstStyle/>
+              <a:p>
+                <a:r>
+                  <a:rPr lang="ja-JP" altLang="en-US">
+                    <a:noFill/>
+                  </a:rPr>
+                  <a:t> </a:t>
+                </a:r>
+              </a:p>
+            </p:txBody>
+          </p:sp>
+        </mc:Fallback>
+      </mc:AlternateContent>
+      <p:cxnSp>
+        <p:nvCxnSpPr>
+          <p:cNvPr id="35" name="直線コネクタ 34">
+            <a:extLst>
+              <a:ext uri="{FF2B5EF4-FFF2-40B4-BE49-F238E27FC236}">
+                <a16:creationId xmlns:a16="http://schemas.microsoft.com/office/drawing/2014/main" id="{4E75D221-DC43-49B1-8BA3-709190991AC4}"/>
+              </a:ext>
+            </a:extLst>
+          </p:cNvPr>
+          <p:cNvCxnSpPr>
+            <a:cxnSpLocks/>
+          </p:cNvCxnSpPr>
+          <p:nvPr/>
+        </p:nvCxnSpPr>
+        <p:spPr>
+          <a:xfrm>
+            <a:off x="2511744" y="8991220"/>
+            <a:ext cx="4313555" cy="0"/>
+          </a:xfrm>
+          <a:prstGeom prst="line">
+            <a:avLst/>
+          </a:prstGeom>
+          <a:ln w="57150">
+            <a:solidFill>
+              <a:schemeClr val="tx1">
+                <a:lumMod val="50000"/>
+                <a:lumOff val="50000"/>
+              </a:schemeClr>
+            </a:solidFill>
+          </a:ln>
+        </p:spPr>
+        <p:style>
+          <a:lnRef idx="1">
+            <a:schemeClr val="dk1"/>
+          </a:lnRef>
+          <a:fillRef idx="0">
+            <a:schemeClr val="dk1"/>
+          </a:fillRef>
+          <a:effectRef idx="0">
+            <a:schemeClr val="dk1"/>
+          </a:effectRef>
+          <a:fontRef idx="minor">
+            <a:schemeClr val="tx1"/>
+          </a:fontRef>
+        </p:style>
+      </p:cxnSp>
+      <p:cxnSp>
+        <p:nvCxnSpPr>
+          <p:cNvPr id="36" name="直線コネクタ 35">
+            <a:extLst>
+              <a:ext uri="{FF2B5EF4-FFF2-40B4-BE49-F238E27FC236}">
+                <a16:creationId xmlns:a16="http://schemas.microsoft.com/office/drawing/2014/main" id="{6436B0E4-14A2-4A69-8D59-93C8C73F29A8}"/>
+              </a:ext>
+            </a:extLst>
+          </p:cNvPr>
+          <p:cNvCxnSpPr>
+            <a:cxnSpLocks/>
+          </p:cNvCxnSpPr>
+          <p:nvPr/>
+        </p:nvCxnSpPr>
+        <p:spPr>
+          <a:xfrm>
+            <a:off x="2542224" y="5878825"/>
+            <a:ext cx="0" cy="3112395"/>
+          </a:xfrm>
+          <a:prstGeom prst="line">
+            <a:avLst/>
+          </a:prstGeom>
+          <a:ln w="57150">
+            <a:solidFill>
+              <a:schemeClr val="tx1">
+                <a:lumMod val="50000"/>
+                <a:lumOff val="50000"/>
+              </a:schemeClr>
+            </a:solidFill>
+          </a:ln>
+        </p:spPr>
+        <p:style>
+          <a:lnRef idx="1">
+            <a:schemeClr val="dk1"/>
+          </a:lnRef>
+          <a:fillRef idx="0">
+            <a:schemeClr val="dk1"/>
+          </a:fillRef>
+          <a:effectRef idx="0">
+            <a:schemeClr val="dk1"/>
+          </a:effectRef>
+          <a:fontRef idx="minor">
+            <a:schemeClr val="tx1"/>
+          </a:fontRef>
+        </p:style>
+      </p:cxnSp>
+      <mc:AlternateContent xmlns:mc="http://schemas.openxmlformats.org/markup-compatibility/2006">
+        <mc:Choice xmlns:a14="http://schemas.microsoft.com/office/drawing/2010/main" Requires="a14">
+          <p:sp>
+            <p:nvSpPr>
+              <p:cNvPr id="37" name="テキスト ボックス 36">
+                <a:extLst>
+                  <a:ext uri="{FF2B5EF4-FFF2-40B4-BE49-F238E27FC236}">
+                    <a16:creationId xmlns:a16="http://schemas.microsoft.com/office/drawing/2014/main" id="{8243B123-DB21-492D-AB03-8D6CCD1CFB43}"/>
+                  </a:ext>
+                </a:extLst>
+              </p:cNvPr>
+              <p:cNvSpPr txBox="1"/>
+              <p:nvPr/>
+            </p:nvSpPr>
+            <p:spPr>
+              <a:xfrm>
+                <a:off x="666942" y="5362363"/>
+                <a:ext cx="3004131" cy="523220"/>
+              </a:xfrm>
+              <a:prstGeom prst="rect">
+                <a:avLst/>
+              </a:prstGeom>
+              <a:noFill/>
+            </p:spPr>
+            <p:txBody>
+              <a:bodyPr wrap="square" rtlCol="0">
+                <a:spAutoFit/>
+              </a:bodyPr>
+              <a:lstStyle/>
+              <a:p>
+                <a:pPr/>
+                <a14:m>
+                  <m:oMathPara xmlns:m="http://schemas.openxmlformats.org/officeDocument/2006/math">
+                    <m:oMathParaPr>
+                      <m:jc m:val="centerGroup"/>
+                    </m:oMathParaPr>
+                    <m:oMath xmlns:m="http://schemas.openxmlformats.org/officeDocument/2006/math">
+                      <m:r>
+                        <a:rPr lang="en-US" altLang="ja-JP" sz="2800" b="1" i="1" smtClean="0">
+                          <a:solidFill>
+                            <a:schemeClr val="tx1">
+                              <a:lumMod val="65000"/>
+                              <a:lumOff val="35000"/>
+                            </a:schemeClr>
+                          </a:solidFill>
+                          <a:latin typeface="Cambria Math" panose="02040503050406030204" pitchFamily="18" charset="0"/>
+                          <a:ea typeface="Meiryo UI" panose="020B0604030504040204" pitchFamily="50" charset="-128"/>
+                        </a:rPr>
+                        <m:t>𝒇𝒓𝒆𝒒</m:t>
+                      </m:r>
+                    </m:oMath>
+                  </m:oMathPara>
+                </a14:m>
+                <a:endParaRPr lang="ja-JP" altLang="en-US" sz="2800" b="1" dirty="0">
+                  <a:solidFill>
+                    <a:schemeClr val="tx1">
+                      <a:lumMod val="65000"/>
+                      <a:lumOff val="35000"/>
+                    </a:schemeClr>
+                  </a:solidFill>
+                  <a:latin typeface="Meiryo UI" panose="020B0604030504040204" pitchFamily="50" charset="-128"/>
+                  <a:ea typeface="Meiryo UI" panose="020B0604030504040204" pitchFamily="50" charset="-128"/>
+                </a:endParaRPr>
+              </a:p>
+            </p:txBody>
+          </p:sp>
+        </mc:Choice>
+        <mc:Fallback>
+          <p:sp>
+            <p:nvSpPr>
+              <p:cNvPr id="37" name="テキスト ボックス 36">
+                <a:extLst>
+                  <a:ext uri="{FF2B5EF4-FFF2-40B4-BE49-F238E27FC236}">
+                    <a16:creationId xmlns:a16="http://schemas.microsoft.com/office/drawing/2014/main" id="{8243B123-DB21-492D-AB03-8D6CCD1CFB43}"/>
+                  </a:ext>
+                </a:extLst>
+              </p:cNvPr>
+              <p:cNvSpPr txBox="1">
+                <a:spLocks noRot="1" noChangeAspect="1" noMove="1" noResize="1" noEditPoints="1" noAdjustHandles="1" noChangeArrowheads="1" noChangeShapeType="1" noTextEdit="1"/>
+              </p:cNvSpPr>
+              <p:nvPr/>
+            </p:nvSpPr>
+            <p:spPr>
+              <a:xfrm>
+                <a:off x="666942" y="5362363"/>
+                <a:ext cx="3004131" cy="523220"/>
+              </a:xfrm>
+              <a:prstGeom prst="rect">
+                <a:avLst/>
+              </a:prstGeom>
+              <a:blipFill>
+                <a:blip r:embed="rId6"/>
+                <a:stretch>
+                  <a:fillRect/>
+                </a:stretch>
+              </a:blipFill>
+            </p:spPr>
+            <p:txBody>
+              <a:bodyPr/>
+              <a:lstStyle/>
+              <a:p>
+                <a:r>
+                  <a:rPr lang="ja-JP" altLang="en-US">
+                    <a:noFill/>
+                  </a:rPr>
+                  <a:t> </a:t>
+                </a:r>
+              </a:p>
+            </p:txBody>
+          </p:sp>
+        </mc:Fallback>
+      </mc:AlternateContent>
+      <p:cxnSp>
+        <p:nvCxnSpPr>
+          <p:cNvPr id="38" name="直線コネクタ 37">
+            <a:extLst>
+              <a:ext uri="{FF2B5EF4-FFF2-40B4-BE49-F238E27FC236}">
+                <a16:creationId xmlns:a16="http://schemas.microsoft.com/office/drawing/2014/main" id="{219E3BDA-76FE-486B-8FD8-C85EF847AB11}"/>
+              </a:ext>
+            </a:extLst>
+          </p:cNvPr>
+          <p:cNvCxnSpPr>
+            <a:cxnSpLocks/>
+          </p:cNvCxnSpPr>
+          <p:nvPr/>
+        </p:nvCxnSpPr>
+        <p:spPr>
+          <a:xfrm>
+            <a:off x="2563614" y="6141912"/>
+            <a:ext cx="4313555" cy="0"/>
+          </a:xfrm>
+          <a:prstGeom prst="line">
+            <a:avLst/>
+          </a:prstGeom>
+          <a:ln w="57150">
+            <a:solidFill>
+              <a:schemeClr val="tx1">
+                <a:lumMod val="50000"/>
+                <a:lumOff val="50000"/>
+              </a:schemeClr>
+            </a:solidFill>
+          </a:ln>
+        </p:spPr>
+        <p:style>
+          <a:lnRef idx="1">
+            <a:schemeClr val="dk1"/>
+          </a:lnRef>
+          <a:fillRef idx="0">
+            <a:schemeClr val="dk1"/>
+          </a:fillRef>
+          <a:effectRef idx="0">
+            <a:schemeClr val="dk1"/>
+          </a:effectRef>
+          <a:fontRef idx="minor">
+            <a:schemeClr val="tx1"/>
+          </a:fontRef>
+        </p:style>
+      </p:cxnSp>
+      <p:cxnSp>
+        <p:nvCxnSpPr>
+          <p:cNvPr id="39" name="直線コネクタ 38">
+            <a:extLst>
+              <a:ext uri="{FF2B5EF4-FFF2-40B4-BE49-F238E27FC236}">
+                <a16:creationId xmlns:a16="http://schemas.microsoft.com/office/drawing/2014/main" id="{13F62044-10CA-4E4B-AD95-BEBA0FE2FF8F}"/>
+              </a:ext>
+            </a:extLst>
+          </p:cNvPr>
+          <p:cNvCxnSpPr>
+            <a:cxnSpLocks/>
+          </p:cNvCxnSpPr>
+          <p:nvPr/>
+        </p:nvCxnSpPr>
+        <p:spPr>
+          <a:xfrm>
+            <a:off x="2517894" y="8273214"/>
+            <a:ext cx="4313555" cy="0"/>
+          </a:xfrm>
+          <a:prstGeom prst="line">
+            <a:avLst/>
+          </a:prstGeom>
+          <a:ln w="57150">
+            <a:solidFill>
+              <a:schemeClr val="tx1">
+                <a:lumMod val="50000"/>
+                <a:lumOff val="50000"/>
+              </a:schemeClr>
+            </a:solidFill>
+          </a:ln>
+        </p:spPr>
+        <p:style>
+          <a:lnRef idx="1">
+            <a:schemeClr val="dk1"/>
+          </a:lnRef>
+          <a:fillRef idx="0">
+            <a:schemeClr val="dk1"/>
+          </a:fillRef>
+          <a:effectRef idx="0">
+            <a:schemeClr val="dk1"/>
+          </a:effectRef>
+          <a:fontRef idx="minor">
+            <a:schemeClr val="tx1"/>
+          </a:fontRef>
+        </p:style>
+      </p:cxnSp>
+      <p:cxnSp>
+        <p:nvCxnSpPr>
+          <p:cNvPr id="40" name="直線コネクタ 39">
+            <a:extLst>
+              <a:ext uri="{FF2B5EF4-FFF2-40B4-BE49-F238E27FC236}">
+                <a16:creationId xmlns:a16="http://schemas.microsoft.com/office/drawing/2014/main" id="{C52E3499-6888-478F-AAA6-99485A17B189}"/>
+              </a:ext>
+            </a:extLst>
+          </p:cNvPr>
+          <p:cNvCxnSpPr>
+            <a:cxnSpLocks/>
+          </p:cNvCxnSpPr>
+          <p:nvPr/>
+        </p:nvCxnSpPr>
+        <p:spPr>
+          <a:xfrm>
+            <a:off x="2904936" y="6122665"/>
+            <a:ext cx="0" cy="1463707"/>
+          </a:xfrm>
+          <a:prstGeom prst="line">
+            <a:avLst/>
+          </a:prstGeom>
+          <a:ln w="57150">
+            <a:solidFill>
+              <a:schemeClr val="tx1">
+                <a:lumMod val="50000"/>
+                <a:lumOff val="50000"/>
+              </a:schemeClr>
+            </a:solidFill>
+          </a:ln>
+        </p:spPr>
+        <p:style>
+          <a:lnRef idx="1">
+            <a:schemeClr val="dk1"/>
+          </a:lnRef>
+          <a:fillRef idx="0">
+            <a:schemeClr val="dk1"/>
+          </a:fillRef>
+          <a:effectRef idx="0">
+            <a:schemeClr val="dk1"/>
+          </a:effectRef>
+          <a:fontRef idx="minor">
+            <a:schemeClr val="tx1"/>
+          </a:fontRef>
+        </p:style>
+      </p:cxnSp>
+      <p:cxnSp>
+        <p:nvCxnSpPr>
+          <p:cNvPr id="41" name="直線コネクタ 40">
+            <a:extLst>
+              <a:ext uri="{FF2B5EF4-FFF2-40B4-BE49-F238E27FC236}">
+                <a16:creationId xmlns:a16="http://schemas.microsoft.com/office/drawing/2014/main" id="{FAF109D8-D7F5-42B1-850A-0778DD79BEEA}"/>
+              </a:ext>
+            </a:extLst>
+          </p:cNvPr>
+          <p:cNvCxnSpPr>
+            <a:cxnSpLocks/>
+          </p:cNvCxnSpPr>
+          <p:nvPr/>
+        </p:nvCxnSpPr>
+        <p:spPr>
+          <a:xfrm>
+            <a:off x="4688766" y="6153145"/>
+            <a:ext cx="0" cy="2537603"/>
+          </a:xfrm>
+          <a:prstGeom prst="line">
+            <a:avLst/>
+          </a:prstGeom>
+          <a:ln w="57150">
+            <a:solidFill>
+              <a:schemeClr val="tx1">
+                <a:lumMod val="50000"/>
+                <a:lumOff val="50000"/>
+              </a:schemeClr>
+            </a:solidFill>
+          </a:ln>
+        </p:spPr>
+        <p:style>
+          <a:lnRef idx="1">
+            <a:schemeClr val="dk1"/>
+          </a:lnRef>
+          <a:fillRef idx="0">
+            <a:schemeClr val="dk1"/>
+          </a:fillRef>
+          <a:effectRef idx="0">
+            <a:schemeClr val="dk1"/>
+          </a:effectRef>
+          <a:fontRef idx="minor">
+            <a:schemeClr val="tx1"/>
+          </a:fontRef>
+        </p:style>
+      </p:cxnSp>
+      <p:cxnSp>
+        <p:nvCxnSpPr>
+          <p:cNvPr id="42" name="直線コネクタ 41">
+            <a:extLst>
+              <a:ext uri="{FF2B5EF4-FFF2-40B4-BE49-F238E27FC236}">
+                <a16:creationId xmlns:a16="http://schemas.microsoft.com/office/drawing/2014/main" id="{C5E5F54F-AA34-437B-8015-BFC8569E0126}"/>
+              </a:ext>
+            </a:extLst>
+          </p:cNvPr>
+          <p:cNvCxnSpPr>
+            <a:cxnSpLocks/>
+          </p:cNvCxnSpPr>
+          <p:nvPr/>
+        </p:nvCxnSpPr>
+        <p:spPr>
+          <a:xfrm>
+            <a:off x="5771014" y="6122665"/>
+            <a:ext cx="0" cy="1463707"/>
+          </a:xfrm>
+          <a:prstGeom prst="line">
+            <a:avLst/>
+          </a:prstGeom>
+          <a:ln w="57150">
+            <a:solidFill>
+              <a:schemeClr val="tx1">
+                <a:lumMod val="50000"/>
+                <a:lumOff val="50000"/>
+              </a:schemeClr>
+            </a:solidFill>
+          </a:ln>
+        </p:spPr>
+        <p:style>
+          <a:lnRef idx="1">
+            <a:schemeClr val="dk1"/>
+          </a:lnRef>
+          <a:fillRef idx="0">
+            <a:schemeClr val="dk1"/>
+          </a:fillRef>
+          <a:effectRef idx="0">
+            <a:schemeClr val="dk1"/>
+          </a:effectRef>
+          <a:fontRef idx="minor">
+            <a:schemeClr val="tx1"/>
+          </a:fontRef>
+        </p:style>
+      </p:cxnSp>
+      <p:cxnSp>
+        <p:nvCxnSpPr>
+          <p:cNvPr id="43" name="直線コネクタ 42">
+            <a:extLst>
+              <a:ext uri="{FF2B5EF4-FFF2-40B4-BE49-F238E27FC236}">
+                <a16:creationId xmlns:a16="http://schemas.microsoft.com/office/drawing/2014/main" id="{F9457191-EB6C-4A59-B691-1452C3D74229}"/>
+              </a:ext>
+            </a:extLst>
+          </p:cNvPr>
+          <p:cNvCxnSpPr>
+            <a:cxnSpLocks/>
+          </p:cNvCxnSpPr>
+          <p:nvPr/>
+        </p:nvCxnSpPr>
+        <p:spPr>
+          <a:xfrm>
+            <a:off x="5415486" y="6135191"/>
+            <a:ext cx="6579" cy="2138023"/>
+          </a:xfrm>
+          <a:prstGeom prst="line">
+            <a:avLst/>
+          </a:prstGeom>
+          <a:ln w="57150">
+            <a:solidFill>
+              <a:schemeClr val="tx1">
+                <a:lumMod val="50000"/>
+                <a:lumOff val="50000"/>
+              </a:schemeClr>
+            </a:solidFill>
+          </a:ln>
+        </p:spPr>
+        <p:style>
+          <a:lnRef idx="1">
+            <a:schemeClr val="dk1"/>
+          </a:lnRef>
+          <a:fillRef idx="0">
+            <a:schemeClr val="dk1"/>
+          </a:fillRef>
+          <a:effectRef idx="0">
+            <a:schemeClr val="dk1"/>
+          </a:effectRef>
+          <a:fontRef idx="minor">
+            <a:schemeClr val="tx1"/>
+          </a:fontRef>
+        </p:style>
+      </p:cxnSp>
+      <p:cxnSp>
+        <p:nvCxnSpPr>
+          <p:cNvPr id="44" name="直線コネクタ 43">
+            <a:extLst>
+              <a:ext uri="{FF2B5EF4-FFF2-40B4-BE49-F238E27FC236}">
+                <a16:creationId xmlns:a16="http://schemas.microsoft.com/office/drawing/2014/main" id="{A0840A87-13D1-46AA-97AE-7285E5A897D8}"/>
+              </a:ext>
+            </a:extLst>
+          </p:cNvPr>
+          <p:cNvCxnSpPr>
+            <a:cxnSpLocks/>
+          </p:cNvCxnSpPr>
+          <p:nvPr/>
+        </p:nvCxnSpPr>
+        <p:spPr>
+          <a:xfrm>
+            <a:off x="6502118" y="6153145"/>
+            <a:ext cx="2711" cy="1433227"/>
+          </a:xfrm>
+          <a:prstGeom prst="line">
+            <a:avLst/>
+          </a:prstGeom>
+          <a:ln w="57150">
+            <a:solidFill>
+              <a:schemeClr val="tx1">
+                <a:lumMod val="50000"/>
+                <a:lumOff val="50000"/>
+              </a:schemeClr>
+            </a:solidFill>
+          </a:ln>
+        </p:spPr>
+        <p:style>
+          <a:lnRef idx="1">
+            <a:schemeClr val="dk1"/>
+          </a:lnRef>
+          <a:fillRef idx="0">
+            <a:schemeClr val="dk1"/>
+          </a:fillRef>
+          <a:effectRef idx="0">
+            <a:schemeClr val="dk1"/>
+          </a:effectRef>
+          <a:fontRef idx="minor">
+            <a:schemeClr val="tx1"/>
+          </a:fontRef>
+        </p:style>
+      </p:cxnSp>
+      <p:cxnSp>
+        <p:nvCxnSpPr>
+          <p:cNvPr id="45" name="直線コネクタ 44">
+            <a:extLst>
+              <a:ext uri="{FF2B5EF4-FFF2-40B4-BE49-F238E27FC236}">
+                <a16:creationId xmlns:a16="http://schemas.microsoft.com/office/drawing/2014/main" id="{99D9C062-4DA6-4B71-B672-D8492D30BFA6}"/>
+              </a:ext>
+            </a:extLst>
+          </p:cNvPr>
+          <p:cNvCxnSpPr>
+            <a:cxnSpLocks/>
+          </p:cNvCxnSpPr>
+          <p:nvPr/>
+        </p:nvCxnSpPr>
+        <p:spPr>
+          <a:xfrm>
+            <a:off x="6839904" y="6168385"/>
+            <a:ext cx="14877" cy="2853315"/>
+          </a:xfrm>
+          <a:prstGeom prst="line">
+            <a:avLst/>
+          </a:prstGeom>
+          <a:ln w="57150">
+            <a:solidFill>
+              <a:schemeClr val="tx1">
+                <a:lumMod val="50000"/>
+                <a:lumOff val="50000"/>
+              </a:schemeClr>
+            </a:solidFill>
+          </a:ln>
+        </p:spPr>
+        <p:style>
+          <a:lnRef idx="1">
+            <a:schemeClr val="dk1"/>
+          </a:lnRef>
+          <a:fillRef idx="0">
+            <a:schemeClr val="dk1"/>
+          </a:fillRef>
+          <a:effectRef idx="0">
+            <a:schemeClr val="dk1"/>
+          </a:effectRef>
+          <a:fontRef idx="minor">
+            <a:schemeClr val="tx1"/>
+          </a:fontRef>
+        </p:style>
+      </p:cxnSp>
+      <p:cxnSp>
+        <p:nvCxnSpPr>
+          <p:cNvPr id="46" name="直線コネクタ 45">
+            <a:extLst>
+              <a:ext uri="{FF2B5EF4-FFF2-40B4-BE49-F238E27FC236}">
+                <a16:creationId xmlns:a16="http://schemas.microsoft.com/office/drawing/2014/main" id="{449C680A-E221-4518-BD97-EA731B87DCEE}"/>
+              </a:ext>
+            </a:extLst>
+          </p:cNvPr>
+          <p:cNvCxnSpPr>
+            <a:cxnSpLocks/>
+          </p:cNvCxnSpPr>
+          <p:nvPr/>
+        </p:nvCxnSpPr>
+        <p:spPr>
+          <a:xfrm>
+            <a:off x="2545034" y="7586372"/>
+            <a:ext cx="4313555" cy="0"/>
+          </a:xfrm>
+          <a:prstGeom prst="line">
+            <a:avLst/>
+          </a:prstGeom>
+          <a:ln w="57150">
+            <a:solidFill>
+              <a:schemeClr val="tx1">
+                <a:lumMod val="50000"/>
+                <a:lumOff val="50000"/>
+              </a:schemeClr>
+            </a:solidFill>
+          </a:ln>
+        </p:spPr>
+        <p:style>
+          <a:lnRef idx="1">
+            <a:schemeClr val="dk1"/>
+          </a:lnRef>
+          <a:fillRef idx="0">
+            <a:schemeClr val="dk1"/>
+          </a:fillRef>
+          <a:effectRef idx="0">
+            <a:schemeClr val="dk1"/>
+          </a:effectRef>
+          <a:fontRef idx="minor">
+            <a:schemeClr val="tx1"/>
+          </a:fontRef>
+        </p:style>
+      </p:cxnSp>
+      <p:cxnSp>
+        <p:nvCxnSpPr>
+          <p:cNvPr id="47" name="直線コネクタ 46">
+            <a:extLst>
+              <a:ext uri="{FF2B5EF4-FFF2-40B4-BE49-F238E27FC236}">
+                <a16:creationId xmlns:a16="http://schemas.microsoft.com/office/drawing/2014/main" id="{8AF57235-3BF4-4FE7-AE32-3905AF29BB2F}"/>
+              </a:ext>
+            </a:extLst>
+          </p:cNvPr>
+          <p:cNvCxnSpPr>
+            <a:cxnSpLocks/>
+          </p:cNvCxnSpPr>
+          <p:nvPr/>
+        </p:nvCxnSpPr>
+        <p:spPr>
+          <a:xfrm>
+            <a:off x="2522070" y="8690748"/>
+            <a:ext cx="4313555" cy="0"/>
+          </a:xfrm>
+          <a:prstGeom prst="line">
+            <a:avLst/>
+          </a:prstGeom>
+          <a:ln w="57150">
+            <a:solidFill>
+              <a:schemeClr val="tx1">
+                <a:lumMod val="50000"/>
+                <a:lumOff val="50000"/>
+              </a:schemeClr>
+            </a:solidFill>
+          </a:ln>
+        </p:spPr>
+        <p:style>
+          <a:lnRef idx="1">
+            <a:schemeClr val="dk1"/>
+          </a:lnRef>
+          <a:fillRef idx="0">
+            <a:schemeClr val="dk1"/>
+          </a:fillRef>
+          <a:effectRef idx="0">
+            <a:schemeClr val="dk1"/>
+          </a:effectRef>
+          <a:fontRef idx="minor">
+            <a:schemeClr val="tx1"/>
+          </a:fontRef>
+        </p:style>
+      </p:cxnSp>
+      <p:cxnSp>
+        <p:nvCxnSpPr>
+          <p:cNvPr id="54" name="直線コネクタ 53">
+            <a:extLst>
+              <a:ext uri="{FF2B5EF4-FFF2-40B4-BE49-F238E27FC236}">
+                <a16:creationId xmlns:a16="http://schemas.microsoft.com/office/drawing/2014/main" id="{B450609D-C9FA-4BA6-A56A-15388CB80D8C}"/>
+              </a:ext>
+            </a:extLst>
+          </p:cNvPr>
+          <p:cNvCxnSpPr>
+            <a:cxnSpLocks/>
+          </p:cNvCxnSpPr>
+          <p:nvPr/>
+        </p:nvCxnSpPr>
+        <p:spPr>
+          <a:xfrm>
+            <a:off x="6144082" y="6112227"/>
+            <a:ext cx="0" cy="2160987"/>
+          </a:xfrm>
+          <a:prstGeom prst="line">
+            <a:avLst/>
+          </a:prstGeom>
+          <a:ln w="57150">
+            <a:solidFill>
+              <a:schemeClr val="tx1">
+                <a:lumMod val="50000"/>
+                <a:lumOff val="50000"/>
+              </a:schemeClr>
+            </a:solidFill>
+          </a:ln>
+        </p:spPr>
+        <p:style>
+          <a:lnRef idx="1">
+            <a:schemeClr val="dk1"/>
+          </a:lnRef>
+          <a:fillRef idx="0">
+            <a:schemeClr val="dk1"/>
+          </a:fillRef>
+          <a:effectRef idx="0">
+            <a:schemeClr val="dk1"/>
+          </a:effectRef>
+          <a:fontRef idx="minor">
+            <a:schemeClr val="tx1"/>
+          </a:fontRef>
+        </p:style>
+      </p:cxnSp>
+      <p:cxnSp>
+        <p:nvCxnSpPr>
+          <p:cNvPr id="55" name="直線コネクタ 54">
+            <a:extLst>
+              <a:ext uri="{FF2B5EF4-FFF2-40B4-BE49-F238E27FC236}">
+                <a16:creationId xmlns:a16="http://schemas.microsoft.com/office/drawing/2014/main" id="{6E3A7195-187C-41F3-BDE0-1CAF3D0FEF87}"/>
+              </a:ext>
+            </a:extLst>
+          </p:cNvPr>
+          <p:cNvCxnSpPr>
+            <a:cxnSpLocks/>
+          </p:cNvCxnSpPr>
+          <p:nvPr/>
+        </p:nvCxnSpPr>
+        <p:spPr>
+          <a:xfrm>
+            <a:off x="5059120" y="6112227"/>
+            <a:ext cx="0" cy="1463707"/>
+          </a:xfrm>
+          <a:prstGeom prst="line">
+            <a:avLst/>
+          </a:prstGeom>
+          <a:ln w="57150">
+            <a:solidFill>
+              <a:schemeClr val="tx1">
+                <a:lumMod val="50000"/>
+                <a:lumOff val="50000"/>
+              </a:schemeClr>
+            </a:solidFill>
+          </a:ln>
+        </p:spPr>
+        <p:style>
+          <a:lnRef idx="1">
+            <a:schemeClr val="dk1"/>
+          </a:lnRef>
+          <a:fillRef idx="0">
+            <a:schemeClr val="dk1"/>
+          </a:fillRef>
+          <a:effectRef idx="0">
+            <a:schemeClr val="dk1"/>
+          </a:effectRef>
+          <a:fontRef idx="minor">
+            <a:schemeClr val="tx1"/>
+          </a:fontRef>
+        </p:style>
+      </p:cxnSp>
+      <p:cxnSp>
+        <p:nvCxnSpPr>
+          <p:cNvPr id="56" name="直線コネクタ 55">
+            <a:extLst>
+              <a:ext uri="{FF2B5EF4-FFF2-40B4-BE49-F238E27FC236}">
+                <a16:creationId xmlns:a16="http://schemas.microsoft.com/office/drawing/2014/main" id="{87B6648B-1689-4EB6-953F-6CD102FFD09D}"/>
+              </a:ext>
+            </a:extLst>
+          </p:cNvPr>
+          <p:cNvCxnSpPr>
+            <a:cxnSpLocks/>
+          </p:cNvCxnSpPr>
+          <p:nvPr/>
+        </p:nvCxnSpPr>
+        <p:spPr>
+          <a:xfrm>
+            <a:off x="3964558" y="6124753"/>
+            <a:ext cx="0" cy="2148461"/>
+          </a:xfrm>
+          <a:prstGeom prst="line">
+            <a:avLst/>
+          </a:prstGeom>
+          <a:ln w="57150">
+            <a:solidFill>
+              <a:schemeClr val="tx1">
+                <a:lumMod val="50000"/>
+                <a:lumOff val="50000"/>
+              </a:schemeClr>
+            </a:solidFill>
+          </a:ln>
+        </p:spPr>
+        <p:style>
+          <a:lnRef idx="1">
+            <a:schemeClr val="dk1"/>
+          </a:lnRef>
+          <a:fillRef idx="0">
+            <a:schemeClr val="dk1"/>
+          </a:fillRef>
+          <a:effectRef idx="0">
+            <a:schemeClr val="dk1"/>
+          </a:effectRef>
+          <a:fontRef idx="minor">
+            <a:schemeClr val="tx1"/>
+          </a:fontRef>
+        </p:style>
+      </p:cxnSp>
+      <p:cxnSp>
+        <p:nvCxnSpPr>
+          <p:cNvPr id="62" name="直線コネクタ 61">
+            <a:extLst>
+              <a:ext uri="{FF2B5EF4-FFF2-40B4-BE49-F238E27FC236}">
+                <a16:creationId xmlns:a16="http://schemas.microsoft.com/office/drawing/2014/main" id="{9314F0F7-0645-4D2D-84C9-7ED505F71C07}"/>
+              </a:ext>
+            </a:extLst>
+          </p:cNvPr>
+          <p:cNvCxnSpPr>
+            <a:cxnSpLocks/>
+          </p:cNvCxnSpPr>
+          <p:nvPr/>
+        </p:nvCxnSpPr>
+        <p:spPr>
+          <a:xfrm>
+            <a:off x="3220846" y="6136945"/>
+            <a:ext cx="0" cy="2148461"/>
+          </a:xfrm>
+          <a:prstGeom prst="line">
+            <a:avLst/>
+          </a:prstGeom>
+          <a:ln w="57150">
+            <a:solidFill>
+              <a:schemeClr val="tx1">
+                <a:lumMod val="50000"/>
+                <a:lumOff val="50000"/>
+              </a:schemeClr>
+            </a:solidFill>
+          </a:ln>
+        </p:spPr>
+        <p:style>
+          <a:lnRef idx="1">
+            <a:schemeClr val="dk1"/>
+          </a:lnRef>
+          <a:fillRef idx="0">
+            <a:schemeClr val="dk1"/>
+          </a:fillRef>
+          <a:effectRef idx="0">
+            <a:schemeClr val="dk1"/>
+          </a:effectRef>
+          <a:fontRef idx="minor">
+            <a:schemeClr val="tx1"/>
+          </a:fontRef>
+        </p:style>
+      </p:cxnSp>
+      <p:cxnSp>
+        <p:nvCxnSpPr>
+          <p:cNvPr id="64" name="直線コネクタ 63">
+            <a:extLst>
+              <a:ext uri="{FF2B5EF4-FFF2-40B4-BE49-F238E27FC236}">
+                <a16:creationId xmlns:a16="http://schemas.microsoft.com/office/drawing/2014/main" id="{480376E2-671F-46C5-835A-A3ABB7638749}"/>
+              </a:ext>
+            </a:extLst>
+          </p:cNvPr>
+          <p:cNvCxnSpPr>
+            <a:cxnSpLocks/>
+          </p:cNvCxnSpPr>
+          <p:nvPr/>
+        </p:nvCxnSpPr>
+        <p:spPr>
+          <a:xfrm>
+            <a:off x="3599880" y="6147049"/>
+            <a:ext cx="0" cy="1463707"/>
+          </a:xfrm>
+          <a:prstGeom prst="line">
+            <a:avLst/>
+          </a:prstGeom>
+          <a:ln w="57150">
+            <a:solidFill>
+              <a:schemeClr val="tx1">
+                <a:lumMod val="50000"/>
+                <a:lumOff val="50000"/>
+              </a:schemeClr>
+            </a:solidFill>
+          </a:ln>
+        </p:spPr>
+        <p:style>
+          <a:lnRef idx="1">
+            <a:schemeClr val="dk1"/>
+          </a:lnRef>
+          <a:fillRef idx="0">
+            <a:schemeClr val="dk1"/>
+          </a:fillRef>
+          <a:effectRef idx="0">
+            <a:schemeClr val="dk1"/>
+          </a:effectRef>
+          <a:fontRef idx="minor">
+            <a:schemeClr val="tx1"/>
+          </a:fontRef>
+        </p:style>
+      </p:cxnSp>
+      <p:cxnSp>
+        <p:nvCxnSpPr>
+          <p:cNvPr id="65" name="直線コネクタ 64">
+            <a:extLst>
+              <a:ext uri="{FF2B5EF4-FFF2-40B4-BE49-F238E27FC236}">
+                <a16:creationId xmlns:a16="http://schemas.microsoft.com/office/drawing/2014/main" id="{C4A2D705-A6A2-4B38-BA08-539F716026C4}"/>
+              </a:ext>
+            </a:extLst>
+          </p:cNvPr>
+          <p:cNvCxnSpPr>
+            <a:cxnSpLocks/>
+          </p:cNvCxnSpPr>
+          <p:nvPr/>
+        </p:nvCxnSpPr>
+        <p:spPr>
+          <a:xfrm>
+            <a:off x="4331400" y="6140953"/>
+            <a:ext cx="0" cy="1463707"/>
+          </a:xfrm>
+          <a:prstGeom prst="line">
+            <a:avLst/>
+          </a:prstGeom>
+          <a:ln w="57150">
+            <a:solidFill>
+              <a:schemeClr val="tx1">
+                <a:lumMod val="50000"/>
+                <a:lumOff val="50000"/>
+              </a:schemeClr>
+            </a:solidFill>
+          </a:ln>
+        </p:spPr>
+        <p:style>
+          <a:lnRef idx="1">
+            <a:schemeClr val="dk1"/>
+          </a:lnRef>
+          <a:fillRef idx="0">
+            <a:schemeClr val="dk1"/>
+          </a:fillRef>
+          <a:effectRef idx="0">
+            <a:schemeClr val="dk1"/>
+          </a:effectRef>
+          <a:fontRef idx="minor">
+            <a:schemeClr val="tx1"/>
+          </a:fontRef>
+        </p:style>
+      </p:cxnSp>
+      <mc:AlternateContent xmlns:mc="http://schemas.openxmlformats.org/markup-compatibility/2006">
+        <mc:Choice xmlns:a14="http://schemas.microsoft.com/office/drawing/2010/main" Requires="a14">
+          <p:sp>
+            <p:nvSpPr>
+              <p:cNvPr id="68" name="テキスト ボックス 67">
+                <a:extLst>
+                  <a:ext uri="{FF2B5EF4-FFF2-40B4-BE49-F238E27FC236}">
+                    <a16:creationId xmlns:a16="http://schemas.microsoft.com/office/drawing/2014/main" id="{FEB8576B-9792-472D-AD8D-80D375690DB4}"/>
+                  </a:ext>
+                </a:extLst>
+              </p:cNvPr>
+              <p:cNvSpPr txBox="1"/>
+              <p:nvPr/>
+            </p:nvSpPr>
+            <p:spPr>
+              <a:xfrm>
+                <a:off x="4912449" y="9000338"/>
+                <a:ext cx="3004131" cy="525913"/>
+              </a:xfrm>
+              <a:prstGeom prst="rect">
+                <a:avLst/>
+              </a:prstGeom>
+              <a:noFill/>
+            </p:spPr>
+            <p:txBody>
+              <a:bodyPr wrap="square" rtlCol="0">
+                <a:spAutoFit/>
+              </a:bodyPr>
+              <a:lstStyle/>
+              <a:p>
+                <a:pPr/>
+                <a14:m>
+                  <m:oMathPara xmlns:m="http://schemas.openxmlformats.org/officeDocument/2006/math">
+                    <m:oMathParaPr>
+                      <m:jc m:val="centerGroup"/>
+                    </m:oMathParaPr>
+                    <m:oMath xmlns:m="http://schemas.openxmlformats.org/officeDocument/2006/math">
+                      <m:r>
+                        <a:rPr lang="en-US" altLang="ja-JP" sz="2800" b="1" i="1" smtClean="0">
+                          <a:solidFill>
+                            <a:schemeClr val="tx1">
+                              <a:lumMod val="65000"/>
+                              <a:lumOff val="35000"/>
+                            </a:schemeClr>
+                          </a:solidFill>
+                          <a:latin typeface="Cambria Math" panose="02040503050406030204" pitchFamily="18" charset="0"/>
+                          <a:ea typeface="Meiryo UI" panose="020B0604030504040204" pitchFamily="50" charset="-128"/>
+                        </a:rPr>
+                        <m:t>𝒕𝒊𝒎𝒆</m:t>
+                      </m:r>
+                    </m:oMath>
+                  </m:oMathPara>
+                </a14:m>
+                <a:endParaRPr lang="ja-JP" altLang="en-US" sz="2800" b="1" dirty="0">
+                  <a:solidFill>
+                    <a:schemeClr val="tx1">
+                      <a:lumMod val="65000"/>
+                      <a:lumOff val="35000"/>
+                    </a:schemeClr>
+                  </a:solidFill>
+                  <a:latin typeface="Meiryo UI" panose="020B0604030504040204" pitchFamily="50" charset="-128"/>
+                  <a:ea typeface="Meiryo UI" panose="020B0604030504040204" pitchFamily="50" charset="-128"/>
+                </a:endParaRPr>
+              </a:p>
+            </p:txBody>
+          </p:sp>
+        </mc:Choice>
+        <mc:Fallback>
+          <p:sp>
+            <p:nvSpPr>
+              <p:cNvPr id="68" name="テキスト ボックス 67">
+                <a:extLst>
+                  <a:ext uri="{FF2B5EF4-FFF2-40B4-BE49-F238E27FC236}">
+                    <a16:creationId xmlns:a16="http://schemas.microsoft.com/office/drawing/2014/main" id="{FEB8576B-9792-472D-AD8D-80D375690DB4}"/>
+                  </a:ext>
+                </a:extLst>
+              </p:cNvPr>
+              <p:cNvSpPr txBox="1">
+                <a:spLocks noRot="1" noChangeAspect="1" noMove="1" noResize="1" noEditPoints="1" noAdjustHandles="1" noChangeArrowheads="1" noChangeShapeType="1" noTextEdit="1"/>
+              </p:cNvSpPr>
+              <p:nvPr/>
+            </p:nvSpPr>
+            <p:spPr>
+              <a:xfrm>
+                <a:off x="4912449" y="9000338"/>
+                <a:ext cx="3004131" cy="525913"/>
+              </a:xfrm>
+              <a:prstGeom prst="rect">
+                <a:avLst/>
+              </a:prstGeom>
+              <a:blipFill>
+                <a:blip r:embed="rId7"/>
                 <a:stretch>
                   <a:fillRect/>
                 </a:stretch>

</xml_diff>